<commit_message>
a yum repo file add
</commit_message>
<xml_diff>
--- a/ch2/ch2-1.pptx
+++ b/ch2/ch2-1.pptx
@@ -1,36 +1,36 @@
 
 <file path=ppt/presentation.xml><?xml version="1.0" encoding="utf-8"?>
-<p:presentation xmlns:a="http://schemas.openxmlformats.org/drawingml/2006/main" xmlns:r="http://schemas.openxmlformats.org/officeDocument/2006/relationships" xmlns:p="http://schemas.openxmlformats.org/presentationml/2006/main" saveSubsetFonts="1" autoCompressPictures="0">
+<p:presentation xmlns:a="http://schemas.openxmlformats.org/drawingml/2006/main" xmlns:r="http://schemas.openxmlformats.org/officeDocument/2006/relationships" xmlns:p="http://schemas.openxmlformats.org/presentationml/2006/main" autoCompressPictures="0">
   <p:sldMasterIdLst>
     <p:sldMasterId id="2147483648" r:id="rId1"/>
   </p:sldMasterIdLst>
   <p:sldIdLst>
-    <p:sldId id="257" r:id="rId2"/>
-    <p:sldId id="258" r:id="rId3"/>
-    <p:sldId id="260" r:id="rId4"/>
-    <p:sldId id="259" r:id="rId5"/>
-    <p:sldId id="261" r:id="rId6"/>
-    <p:sldId id="262" r:id="rId7"/>
-    <p:sldId id="263" r:id="rId8"/>
-    <p:sldId id="264" r:id="rId9"/>
-    <p:sldId id="268" r:id="rId10"/>
-    <p:sldId id="269" r:id="rId11"/>
-    <p:sldId id="270" r:id="rId12"/>
-    <p:sldId id="271" r:id="rId13"/>
-    <p:sldId id="273" r:id="rId14"/>
-    <p:sldId id="274" r:id="rId15"/>
-    <p:sldId id="272" r:id="rId16"/>
-    <p:sldId id="275" r:id="rId17"/>
-    <p:sldId id="276" r:id="rId18"/>
-    <p:sldId id="277" r:id="rId19"/>
-    <p:sldId id="278" r:id="rId20"/>
-    <p:sldId id="279" r:id="rId21"/>
-    <p:sldId id="280" r:id="rId22"/>
-    <p:sldId id="281" r:id="rId23"/>
-    <p:sldId id="282" r:id="rId24"/>
-    <p:sldId id="283" r:id="rId25"/>
-    <p:sldId id="284" r:id="rId26"/>
-    <p:sldId id="285" r:id="rId27"/>
+    <p:sldId id="257" r:id="rId3"/>
+    <p:sldId id="258" r:id="rId4"/>
+    <p:sldId id="260" r:id="rId5"/>
+    <p:sldId id="259" r:id="rId6"/>
+    <p:sldId id="261" r:id="rId7"/>
+    <p:sldId id="262" r:id="rId8"/>
+    <p:sldId id="263" r:id="rId9"/>
+    <p:sldId id="264" r:id="rId10"/>
+    <p:sldId id="268" r:id="rId11"/>
+    <p:sldId id="269" r:id="rId12"/>
+    <p:sldId id="270" r:id="rId13"/>
+    <p:sldId id="271" r:id="rId14"/>
+    <p:sldId id="273" r:id="rId15"/>
+    <p:sldId id="274" r:id="rId16"/>
+    <p:sldId id="272" r:id="rId17"/>
+    <p:sldId id="275" r:id="rId18"/>
+    <p:sldId id="276" r:id="rId19"/>
+    <p:sldId id="277" r:id="rId20"/>
+    <p:sldId id="278" r:id="rId21"/>
+    <p:sldId id="279" r:id="rId22"/>
+    <p:sldId id="280" r:id="rId23"/>
+    <p:sldId id="281" r:id="rId24"/>
+    <p:sldId id="282" r:id="rId25"/>
+    <p:sldId id="283" r:id="rId26"/>
+    <p:sldId id="284" r:id="rId27"/>
+    <p:sldId id="285" r:id="rId28"/>
   </p:sldIdLst>
   <p:sldSz cx="12192000" cy="6858000"/>
   <p:notesSz cx="6858000" cy="9144000"/>
@@ -129,11 +129,6 @@
       </a:defRPr>
     </a:lvl9pPr>
   </p:defaultTextStyle>
-  <p:extLst>
-    <p:ext uri="{EFAFB233-063F-42B5-8137-9DF3F51BA10A}">
-      <p15:sldGuideLst xmlns:p15="http://schemas.microsoft.com/office/powerpoint/2012/main"/>
-    </p:ext>
-  </p:extLst>
 </p:presentation>
 </file>
 
@@ -156,13 +151,7 @@
       </p:grpSpPr>
       <p:sp>
         <p:nvSpPr>
-          <p:cNvPr id="2" name="标题 1">
-            <a:extLst>
-              <a:ext uri="{FF2B5EF4-FFF2-40B4-BE49-F238E27FC236}">
-                <a16:creationId xmlns:a16="http://schemas.microsoft.com/office/drawing/2014/main" id="{D2C4D770-BC84-644E-9999-C946F6577AE4}"/>
-              </a:ext>
-            </a:extLst>
-          </p:cNvPr>
+          <p:cNvPr id="2" name="标题 1"/>
           <p:cNvSpPr>
             <a:spLocks noGrp="1"/>
           </p:cNvSpPr>
@@ -188,18 +177,13 @@
               <a:rPr kumimoji="1" lang="zh-CN" altLang="en-US"/>
               <a:t>单击此处编辑母版标题样式</a:t>
             </a:r>
-          </a:p>
-        </p:txBody>
-      </p:sp>
-      <p:sp>
-        <p:nvSpPr>
-          <p:cNvPr id="3" name="副标题 2">
-            <a:extLst>
-              <a:ext uri="{FF2B5EF4-FFF2-40B4-BE49-F238E27FC236}">
-                <a16:creationId xmlns:a16="http://schemas.microsoft.com/office/drawing/2014/main" id="{7DF36E87-C403-1541-9320-B2572E8C74E8}"/>
-              </a:ext>
-            </a:extLst>
-          </p:cNvPr>
+            <a:endParaRPr kumimoji="1" lang="zh-CN" altLang="en-US"/>
+          </a:p>
+        </p:txBody>
+      </p:sp>
+      <p:sp>
+        <p:nvSpPr>
+          <p:cNvPr id="3" name="副标题 2"/>
           <p:cNvSpPr>
             <a:spLocks noGrp="1"/>
           </p:cNvSpPr>
@@ -258,18 +242,13 @@
               <a:rPr kumimoji="1" lang="zh-CN" altLang="en-US"/>
               <a:t>单击此处编辑母版副标题样式</a:t>
             </a:r>
-          </a:p>
-        </p:txBody>
-      </p:sp>
-      <p:sp>
-        <p:nvSpPr>
-          <p:cNvPr id="4" name="日期占位符 3">
-            <a:extLst>
-              <a:ext uri="{FF2B5EF4-FFF2-40B4-BE49-F238E27FC236}">
-                <a16:creationId xmlns:a16="http://schemas.microsoft.com/office/drawing/2014/main" id="{E97A034F-94E6-FD48-A69C-77A0A69DD916}"/>
-              </a:ext>
-            </a:extLst>
-          </p:cNvPr>
+            <a:endParaRPr kumimoji="1" lang="zh-CN" altLang="en-US"/>
+          </a:p>
+        </p:txBody>
+      </p:sp>
+      <p:sp>
+        <p:nvSpPr>
+          <p:cNvPr id="4" name="日期占位符 3"/>
           <p:cNvSpPr>
             <a:spLocks noGrp="1"/>
           </p:cNvSpPr>
@@ -284,7 +263,6 @@
           <a:p>
             <a:fld id="{9CA8AC9F-E80F-4C42-8A44-D918095D00A4}" type="datetimeFigureOut">
               <a:rPr kumimoji="1" lang="zh-CN" altLang="en-US" smtClean="0"/>
-              <a:t>2020/3/31</a:t>
             </a:fld>
             <a:endParaRPr kumimoji="1" lang="zh-CN" altLang="en-US"/>
           </a:p>
@@ -292,13 +270,7 @@
       </p:sp>
       <p:sp>
         <p:nvSpPr>
-          <p:cNvPr id="5" name="页脚占位符 4">
-            <a:extLst>
-              <a:ext uri="{FF2B5EF4-FFF2-40B4-BE49-F238E27FC236}">
-                <a16:creationId xmlns:a16="http://schemas.microsoft.com/office/drawing/2014/main" id="{26D1366D-B4C5-0C48-8930-691FCC030567}"/>
-              </a:ext>
-            </a:extLst>
-          </p:cNvPr>
+          <p:cNvPr id="5" name="页脚占位符 4"/>
           <p:cNvSpPr>
             <a:spLocks noGrp="1"/>
           </p:cNvSpPr>
@@ -317,13 +289,7 @@
       </p:sp>
       <p:sp>
         <p:nvSpPr>
-          <p:cNvPr id="6" name="灯片编号占位符 5">
-            <a:extLst>
-              <a:ext uri="{FF2B5EF4-FFF2-40B4-BE49-F238E27FC236}">
-                <a16:creationId xmlns:a16="http://schemas.microsoft.com/office/drawing/2014/main" id="{B4714C7B-3A42-0040-951B-575A4DC87F77}"/>
-              </a:ext>
-            </a:extLst>
-          </p:cNvPr>
+          <p:cNvPr id="6" name="灯片编号占位符 5"/>
           <p:cNvSpPr>
             <a:spLocks noGrp="1"/>
           </p:cNvSpPr>
@@ -338,18 +304,12 @@
           <a:p>
             <a:fld id="{06A499BB-1C25-EA47-BDEA-EC5E7D61AD91}" type="slidenum">
               <a:rPr kumimoji="1" lang="zh-CN" altLang="en-US" smtClean="0"/>
-              <a:t>‹#›</a:t>
             </a:fld>
             <a:endParaRPr kumimoji="1" lang="zh-CN" altLang="en-US"/>
           </a:p>
         </p:txBody>
       </p:sp>
     </p:spTree>
-    <p:extLst>
-      <p:ext uri="{BB962C8B-B14F-4D97-AF65-F5344CB8AC3E}">
-        <p14:creationId xmlns:p14="http://schemas.microsoft.com/office/powerpoint/2010/main" val="416982359"/>
-      </p:ext>
-    </p:extLst>
   </p:cSld>
   <p:clrMapOvr>
     <a:masterClrMapping/>
@@ -376,13 +336,7 @@
       </p:grpSpPr>
       <p:sp>
         <p:nvSpPr>
-          <p:cNvPr id="2" name="标题 1">
-            <a:extLst>
-              <a:ext uri="{FF2B5EF4-FFF2-40B4-BE49-F238E27FC236}">
-                <a16:creationId xmlns:a16="http://schemas.microsoft.com/office/drawing/2014/main" id="{FE846AB4-DEB2-A345-B7F1-D456BDA6AFD2}"/>
-              </a:ext>
-            </a:extLst>
-          </p:cNvPr>
+          <p:cNvPr id="2" name="标题 1"/>
           <p:cNvSpPr>
             <a:spLocks noGrp="1"/>
           </p:cNvSpPr>
@@ -399,18 +353,13 @@
               <a:rPr kumimoji="1" lang="zh-CN" altLang="en-US"/>
               <a:t>单击此处编辑母版标题样式</a:t>
             </a:r>
-          </a:p>
-        </p:txBody>
-      </p:sp>
-      <p:sp>
-        <p:nvSpPr>
-          <p:cNvPr id="3" name="竖排文字占位符 2">
-            <a:extLst>
-              <a:ext uri="{FF2B5EF4-FFF2-40B4-BE49-F238E27FC236}">
-                <a16:creationId xmlns:a16="http://schemas.microsoft.com/office/drawing/2014/main" id="{907A955C-E997-D248-8FDE-B07C6C638255}"/>
-              </a:ext>
-            </a:extLst>
-          </p:cNvPr>
+            <a:endParaRPr kumimoji="1" lang="zh-CN" altLang="en-US"/>
+          </a:p>
+        </p:txBody>
+      </p:sp>
+      <p:sp>
+        <p:nvSpPr>
+          <p:cNvPr id="3" name="竖排文字占位符 2"/>
           <p:cNvSpPr>
             <a:spLocks noGrp="1"/>
           </p:cNvSpPr>
@@ -428,6 +377,7 @@
               <a:rPr kumimoji="1" lang="zh-CN" altLang="en-US"/>
               <a:t>单击此处编辑母版文本样式</a:t>
             </a:r>
+            <a:endParaRPr kumimoji="1" lang="zh-CN" altLang="en-US"/>
           </a:p>
           <a:p>
             <a:pPr lvl="1"/>
@@ -435,6 +385,7 @@
               <a:rPr kumimoji="1" lang="zh-CN" altLang="en-US"/>
               <a:t>二级</a:t>
             </a:r>
+            <a:endParaRPr kumimoji="1" lang="zh-CN" altLang="en-US"/>
           </a:p>
           <a:p>
             <a:pPr lvl="2"/>
@@ -442,6 +393,7 @@
               <a:rPr kumimoji="1" lang="zh-CN" altLang="en-US"/>
               <a:t>三级</a:t>
             </a:r>
+            <a:endParaRPr kumimoji="1" lang="zh-CN" altLang="en-US"/>
           </a:p>
           <a:p>
             <a:pPr lvl="3"/>
@@ -449,6 +401,7 @@
               <a:rPr kumimoji="1" lang="zh-CN" altLang="en-US"/>
               <a:t>四级</a:t>
             </a:r>
+            <a:endParaRPr kumimoji="1" lang="zh-CN" altLang="en-US"/>
           </a:p>
           <a:p>
             <a:pPr lvl="4"/>
@@ -456,18 +409,13 @@
               <a:rPr kumimoji="1" lang="zh-CN" altLang="en-US"/>
               <a:t>五级</a:t>
             </a:r>
-          </a:p>
-        </p:txBody>
-      </p:sp>
-      <p:sp>
-        <p:nvSpPr>
-          <p:cNvPr id="4" name="日期占位符 3">
-            <a:extLst>
-              <a:ext uri="{FF2B5EF4-FFF2-40B4-BE49-F238E27FC236}">
-                <a16:creationId xmlns:a16="http://schemas.microsoft.com/office/drawing/2014/main" id="{ECFBE4DF-4FB4-034A-87DD-3B20F13C5D06}"/>
-              </a:ext>
-            </a:extLst>
-          </p:cNvPr>
+            <a:endParaRPr kumimoji="1" lang="zh-CN" altLang="en-US"/>
+          </a:p>
+        </p:txBody>
+      </p:sp>
+      <p:sp>
+        <p:nvSpPr>
+          <p:cNvPr id="4" name="日期占位符 3"/>
           <p:cNvSpPr>
             <a:spLocks noGrp="1"/>
           </p:cNvSpPr>
@@ -482,7 +430,6 @@
           <a:p>
             <a:fld id="{9CA8AC9F-E80F-4C42-8A44-D918095D00A4}" type="datetimeFigureOut">
               <a:rPr kumimoji="1" lang="zh-CN" altLang="en-US" smtClean="0"/>
-              <a:t>2020/3/31</a:t>
             </a:fld>
             <a:endParaRPr kumimoji="1" lang="zh-CN" altLang="en-US"/>
           </a:p>
@@ -490,13 +437,7 @@
       </p:sp>
       <p:sp>
         <p:nvSpPr>
-          <p:cNvPr id="5" name="页脚占位符 4">
-            <a:extLst>
-              <a:ext uri="{FF2B5EF4-FFF2-40B4-BE49-F238E27FC236}">
-                <a16:creationId xmlns:a16="http://schemas.microsoft.com/office/drawing/2014/main" id="{5EEEE7CC-CBA6-FB4D-876D-BFB6B1E62FA2}"/>
-              </a:ext>
-            </a:extLst>
-          </p:cNvPr>
+          <p:cNvPr id="5" name="页脚占位符 4"/>
           <p:cNvSpPr>
             <a:spLocks noGrp="1"/>
           </p:cNvSpPr>
@@ -515,13 +456,7 @@
       </p:sp>
       <p:sp>
         <p:nvSpPr>
-          <p:cNvPr id="6" name="灯片编号占位符 5">
-            <a:extLst>
-              <a:ext uri="{FF2B5EF4-FFF2-40B4-BE49-F238E27FC236}">
-                <a16:creationId xmlns:a16="http://schemas.microsoft.com/office/drawing/2014/main" id="{5BE59CE3-3C54-2C44-8ABB-8EF775EAB028}"/>
-              </a:ext>
-            </a:extLst>
-          </p:cNvPr>
+          <p:cNvPr id="6" name="灯片编号占位符 5"/>
           <p:cNvSpPr>
             <a:spLocks noGrp="1"/>
           </p:cNvSpPr>
@@ -536,18 +471,12 @@
           <a:p>
             <a:fld id="{06A499BB-1C25-EA47-BDEA-EC5E7D61AD91}" type="slidenum">
               <a:rPr kumimoji="1" lang="zh-CN" altLang="en-US" smtClean="0"/>
-              <a:t>‹#›</a:t>
             </a:fld>
             <a:endParaRPr kumimoji="1" lang="zh-CN" altLang="en-US"/>
           </a:p>
         </p:txBody>
       </p:sp>
     </p:spTree>
-    <p:extLst>
-      <p:ext uri="{BB962C8B-B14F-4D97-AF65-F5344CB8AC3E}">
-        <p14:creationId xmlns:p14="http://schemas.microsoft.com/office/powerpoint/2010/main" val="4264362167"/>
-      </p:ext>
-    </p:extLst>
   </p:cSld>
   <p:clrMapOvr>
     <a:masterClrMapping/>
@@ -574,13 +503,7 @@
       </p:grpSpPr>
       <p:sp>
         <p:nvSpPr>
-          <p:cNvPr id="2" name="竖排标题 1">
-            <a:extLst>
-              <a:ext uri="{FF2B5EF4-FFF2-40B4-BE49-F238E27FC236}">
-                <a16:creationId xmlns:a16="http://schemas.microsoft.com/office/drawing/2014/main" id="{6503AEA8-92B9-224B-8135-ED17BCEDEDD8}"/>
-              </a:ext>
-            </a:extLst>
-          </p:cNvPr>
+          <p:cNvPr id="2" name="竖排标题 1"/>
           <p:cNvSpPr>
             <a:spLocks noGrp="1"/>
           </p:cNvSpPr>
@@ -602,18 +525,13 @@
               <a:rPr kumimoji="1" lang="zh-CN" altLang="en-US"/>
               <a:t>单击此处编辑母版标题样式</a:t>
             </a:r>
-          </a:p>
-        </p:txBody>
-      </p:sp>
-      <p:sp>
-        <p:nvSpPr>
-          <p:cNvPr id="3" name="竖排文字占位符 2">
-            <a:extLst>
-              <a:ext uri="{FF2B5EF4-FFF2-40B4-BE49-F238E27FC236}">
-                <a16:creationId xmlns:a16="http://schemas.microsoft.com/office/drawing/2014/main" id="{666AFFAE-8C79-7147-B0C9-8AFBA853E712}"/>
-              </a:ext>
-            </a:extLst>
-          </p:cNvPr>
+            <a:endParaRPr kumimoji="1" lang="zh-CN" altLang="en-US"/>
+          </a:p>
+        </p:txBody>
+      </p:sp>
+      <p:sp>
+        <p:nvSpPr>
+          <p:cNvPr id="3" name="竖排文字占位符 2"/>
           <p:cNvSpPr>
             <a:spLocks noGrp="1"/>
           </p:cNvSpPr>
@@ -636,6 +554,7 @@
               <a:rPr kumimoji="1" lang="zh-CN" altLang="en-US"/>
               <a:t>单击此处编辑母版文本样式</a:t>
             </a:r>
+            <a:endParaRPr kumimoji="1" lang="zh-CN" altLang="en-US"/>
           </a:p>
           <a:p>
             <a:pPr lvl="1"/>
@@ -643,6 +562,7 @@
               <a:rPr kumimoji="1" lang="zh-CN" altLang="en-US"/>
               <a:t>二级</a:t>
             </a:r>
+            <a:endParaRPr kumimoji="1" lang="zh-CN" altLang="en-US"/>
           </a:p>
           <a:p>
             <a:pPr lvl="2"/>
@@ -650,6 +570,7 @@
               <a:rPr kumimoji="1" lang="zh-CN" altLang="en-US"/>
               <a:t>三级</a:t>
             </a:r>
+            <a:endParaRPr kumimoji="1" lang="zh-CN" altLang="en-US"/>
           </a:p>
           <a:p>
             <a:pPr lvl="3"/>
@@ -657,6 +578,7 @@
               <a:rPr kumimoji="1" lang="zh-CN" altLang="en-US"/>
               <a:t>四级</a:t>
             </a:r>
+            <a:endParaRPr kumimoji="1" lang="zh-CN" altLang="en-US"/>
           </a:p>
           <a:p>
             <a:pPr lvl="4"/>
@@ -664,18 +586,13 @@
               <a:rPr kumimoji="1" lang="zh-CN" altLang="en-US"/>
               <a:t>五级</a:t>
             </a:r>
-          </a:p>
-        </p:txBody>
-      </p:sp>
-      <p:sp>
-        <p:nvSpPr>
-          <p:cNvPr id="4" name="日期占位符 3">
-            <a:extLst>
-              <a:ext uri="{FF2B5EF4-FFF2-40B4-BE49-F238E27FC236}">
-                <a16:creationId xmlns:a16="http://schemas.microsoft.com/office/drawing/2014/main" id="{DE4D59EF-6FDC-A248-A136-6874480B08E7}"/>
-              </a:ext>
-            </a:extLst>
-          </p:cNvPr>
+            <a:endParaRPr kumimoji="1" lang="zh-CN" altLang="en-US"/>
+          </a:p>
+        </p:txBody>
+      </p:sp>
+      <p:sp>
+        <p:nvSpPr>
+          <p:cNvPr id="4" name="日期占位符 3"/>
           <p:cNvSpPr>
             <a:spLocks noGrp="1"/>
           </p:cNvSpPr>
@@ -690,7 +607,6 @@
           <a:p>
             <a:fld id="{9CA8AC9F-E80F-4C42-8A44-D918095D00A4}" type="datetimeFigureOut">
               <a:rPr kumimoji="1" lang="zh-CN" altLang="en-US" smtClean="0"/>
-              <a:t>2020/3/31</a:t>
             </a:fld>
             <a:endParaRPr kumimoji="1" lang="zh-CN" altLang="en-US"/>
           </a:p>
@@ -698,13 +614,7 @@
       </p:sp>
       <p:sp>
         <p:nvSpPr>
-          <p:cNvPr id="5" name="页脚占位符 4">
-            <a:extLst>
-              <a:ext uri="{FF2B5EF4-FFF2-40B4-BE49-F238E27FC236}">
-                <a16:creationId xmlns:a16="http://schemas.microsoft.com/office/drawing/2014/main" id="{B08E663B-49C5-824D-B857-D03FC55A012B}"/>
-              </a:ext>
-            </a:extLst>
-          </p:cNvPr>
+          <p:cNvPr id="5" name="页脚占位符 4"/>
           <p:cNvSpPr>
             <a:spLocks noGrp="1"/>
           </p:cNvSpPr>
@@ -723,13 +633,7 @@
       </p:sp>
       <p:sp>
         <p:nvSpPr>
-          <p:cNvPr id="6" name="灯片编号占位符 5">
-            <a:extLst>
-              <a:ext uri="{FF2B5EF4-FFF2-40B4-BE49-F238E27FC236}">
-                <a16:creationId xmlns:a16="http://schemas.microsoft.com/office/drawing/2014/main" id="{1EAC0773-E4CB-5244-8B13-3574FE4805E4}"/>
-              </a:ext>
-            </a:extLst>
-          </p:cNvPr>
+          <p:cNvPr id="6" name="灯片编号占位符 5"/>
           <p:cNvSpPr>
             <a:spLocks noGrp="1"/>
           </p:cNvSpPr>
@@ -744,18 +648,12 @@
           <a:p>
             <a:fld id="{06A499BB-1C25-EA47-BDEA-EC5E7D61AD91}" type="slidenum">
               <a:rPr kumimoji="1" lang="zh-CN" altLang="en-US" smtClean="0"/>
-              <a:t>‹#›</a:t>
             </a:fld>
             <a:endParaRPr kumimoji="1" lang="zh-CN" altLang="en-US"/>
           </a:p>
         </p:txBody>
       </p:sp>
     </p:spTree>
-    <p:extLst>
-      <p:ext uri="{BB962C8B-B14F-4D97-AF65-F5344CB8AC3E}">
-        <p14:creationId xmlns:p14="http://schemas.microsoft.com/office/powerpoint/2010/main" val="3862550550"/>
-      </p:ext>
-    </p:extLst>
   </p:cSld>
   <p:clrMapOvr>
     <a:masterClrMapping/>
@@ -782,13 +680,7 @@
       </p:grpSpPr>
       <p:sp>
         <p:nvSpPr>
-          <p:cNvPr id="2" name="标题 1">
-            <a:extLst>
-              <a:ext uri="{FF2B5EF4-FFF2-40B4-BE49-F238E27FC236}">
-                <a16:creationId xmlns:a16="http://schemas.microsoft.com/office/drawing/2014/main" id="{3C38F86F-0C0F-CB4C-A5E9-04C9DBA88117}"/>
-              </a:ext>
-            </a:extLst>
-          </p:cNvPr>
+          <p:cNvPr id="2" name="标题 1"/>
           <p:cNvSpPr>
             <a:spLocks noGrp="1"/>
           </p:cNvSpPr>
@@ -805,18 +697,13 @@
               <a:rPr kumimoji="1" lang="zh-CN" altLang="en-US"/>
               <a:t>单击此处编辑母版标题样式</a:t>
             </a:r>
-          </a:p>
-        </p:txBody>
-      </p:sp>
-      <p:sp>
-        <p:nvSpPr>
-          <p:cNvPr id="3" name="内容占位符 2">
-            <a:extLst>
-              <a:ext uri="{FF2B5EF4-FFF2-40B4-BE49-F238E27FC236}">
-                <a16:creationId xmlns:a16="http://schemas.microsoft.com/office/drawing/2014/main" id="{EE632E1F-A202-5D4D-BA18-C6D88CCFDE7C}"/>
-              </a:ext>
-            </a:extLst>
-          </p:cNvPr>
+            <a:endParaRPr kumimoji="1" lang="zh-CN" altLang="en-US"/>
+          </a:p>
+        </p:txBody>
+      </p:sp>
+      <p:sp>
+        <p:nvSpPr>
+          <p:cNvPr id="3" name="内容占位符 2"/>
           <p:cNvSpPr>
             <a:spLocks noGrp="1"/>
           </p:cNvSpPr>
@@ -834,6 +721,7 @@
               <a:rPr kumimoji="1" lang="zh-CN" altLang="en-US"/>
               <a:t>单击此处编辑母版文本样式</a:t>
             </a:r>
+            <a:endParaRPr kumimoji="1" lang="zh-CN" altLang="en-US"/>
           </a:p>
           <a:p>
             <a:pPr lvl="1"/>
@@ -841,6 +729,7 @@
               <a:rPr kumimoji="1" lang="zh-CN" altLang="en-US"/>
               <a:t>二级</a:t>
             </a:r>
+            <a:endParaRPr kumimoji="1" lang="zh-CN" altLang="en-US"/>
           </a:p>
           <a:p>
             <a:pPr lvl="2"/>
@@ -848,6 +737,7 @@
               <a:rPr kumimoji="1" lang="zh-CN" altLang="en-US"/>
               <a:t>三级</a:t>
             </a:r>
+            <a:endParaRPr kumimoji="1" lang="zh-CN" altLang="en-US"/>
           </a:p>
           <a:p>
             <a:pPr lvl="3"/>
@@ -855,6 +745,7 @@
               <a:rPr kumimoji="1" lang="zh-CN" altLang="en-US"/>
               <a:t>四级</a:t>
             </a:r>
+            <a:endParaRPr kumimoji="1" lang="zh-CN" altLang="en-US"/>
           </a:p>
           <a:p>
             <a:pPr lvl="4"/>
@@ -862,18 +753,13 @@
               <a:rPr kumimoji="1" lang="zh-CN" altLang="en-US"/>
               <a:t>五级</a:t>
             </a:r>
-          </a:p>
-        </p:txBody>
-      </p:sp>
-      <p:sp>
-        <p:nvSpPr>
-          <p:cNvPr id="4" name="日期占位符 3">
-            <a:extLst>
-              <a:ext uri="{FF2B5EF4-FFF2-40B4-BE49-F238E27FC236}">
-                <a16:creationId xmlns:a16="http://schemas.microsoft.com/office/drawing/2014/main" id="{2C949CCD-CB0B-584F-9E54-4B109861235F}"/>
-              </a:ext>
-            </a:extLst>
-          </p:cNvPr>
+            <a:endParaRPr kumimoji="1" lang="zh-CN" altLang="en-US"/>
+          </a:p>
+        </p:txBody>
+      </p:sp>
+      <p:sp>
+        <p:nvSpPr>
+          <p:cNvPr id="4" name="日期占位符 3"/>
           <p:cNvSpPr>
             <a:spLocks noGrp="1"/>
           </p:cNvSpPr>
@@ -888,7 +774,6 @@
           <a:p>
             <a:fld id="{9CA8AC9F-E80F-4C42-8A44-D918095D00A4}" type="datetimeFigureOut">
               <a:rPr kumimoji="1" lang="zh-CN" altLang="en-US" smtClean="0"/>
-              <a:t>2020/3/31</a:t>
             </a:fld>
             <a:endParaRPr kumimoji="1" lang="zh-CN" altLang="en-US"/>
           </a:p>
@@ -896,13 +781,7 @@
       </p:sp>
       <p:sp>
         <p:nvSpPr>
-          <p:cNvPr id="5" name="页脚占位符 4">
-            <a:extLst>
-              <a:ext uri="{FF2B5EF4-FFF2-40B4-BE49-F238E27FC236}">
-                <a16:creationId xmlns:a16="http://schemas.microsoft.com/office/drawing/2014/main" id="{2D44A8BA-00BC-914E-AF19-A87EA36282DB}"/>
-              </a:ext>
-            </a:extLst>
-          </p:cNvPr>
+          <p:cNvPr id="5" name="页脚占位符 4"/>
           <p:cNvSpPr>
             <a:spLocks noGrp="1"/>
           </p:cNvSpPr>
@@ -921,13 +800,7 @@
       </p:sp>
       <p:sp>
         <p:nvSpPr>
-          <p:cNvPr id="6" name="灯片编号占位符 5">
-            <a:extLst>
-              <a:ext uri="{FF2B5EF4-FFF2-40B4-BE49-F238E27FC236}">
-                <a16:creationId xmlns:a16="http://schemas.microsoft.com/office/drawing/2014/main" id="{64EA06D5-6A23-5040-9EB0-6AD0DB1E397C}"/>
-              </a:ext>
-            </a:extLst>
-          </p:cNvPr>
+          <p:cNvPr id="6" name="灯片编号占位符 5"/>
           <p:cNvSpPr>
             <a:spLocks noGrp="1"/>
           </p:cNvSpPr>
@@ -942,18 +815,12 @@
           <a:p>
             <a:fld id="{06A499BB-1C25-EA47-BDEA-EC5E7D61AD91}" type="slidenum">
               <a:rPr kumimoji="1" lang="zh-CN" altLang="en-US" smtClean="0"/>
-              <a:t>‹#›</a:t>
             </a:fld>
             <a:endParaRPr kumimoji="1" lang="zh-CN" altLang="en-US"/>
           </a:p>
         </p:txBody>
       </p:sp>
     </p:spTree>
-    <p:extLst>
-      <p:ext uri="{BB962C8B-B14F-4D97-AF65-F5344CB8AC3E}">
-        <p14:creationId xmlns:p14="http://schemas.microsoft.com/office/powerpoint/2010/main" val="2559113028"/>
-      </p:ext>
-    </p:extLst>
   </p:cSld>
   <p:clrMapOvr>
     <a:masterClrMapping/>
@@ -980,13 +847,7 @@
       </p:grpSpPr>
       <p:sp>
         <p:nvSpPr>
-          <p:cNvPr id="2" name="标题 1">
-            <a:extLst>
-              <a:ext uri="{FF2B5EF4-FFF2-40B4-BE49-F238E27FC236}">
-                <a16:creationId xmlns:a16="http://schemas.microsoft.com/office/drawing/2014/main" id="{8EF158E0-B3E0-D04D-9702-C85A255C9182}"/>
-              </a:ext>
-            </a:extLst>
-          </p:cNvPr>
+          <p:cNvPr id="2" name="标题 1"/>
           <p:cNvSpPr>
             <a:spLocks noGrp="1"/>
           </p:cNvSpPr>
@@ -1012,18 +873,13 @@
               <a:rPr kumimoji="1" lang="zh-CN" altLang="en-US"/>
               <a:t>单击此处编辑母版标题样式</a:t>
             </a:r>
-          </a:p>
-        </p:txBody>
-      </p:sp>
-      <p:sp>
-        <p:nvSpPr>
-          <p:cNvPr id="3" name="文本占位符 2">
-            <a:extLst>
-              <a:ext uri="{FF2B5EF4-FFF2-40B4-BE49-F238E27FC236}">
-                <a16:creationId xmlns:a16="http://schemas.microsoft.com/office/drawing/2014/main" id="{0E3D91D2-4ACE-C742-A03C-A5B526A815B2}"/>
-              </a:ext>
-            </a:extLst>
-          </p:cNvPr>
+            <a:endParaRPr kumimoji="1" lang="zh-CN" altLang="en-US"/>
+          </a:p>
+        </p:txBody>
+      </p:sp>
+      <p:sp>
+        <p:nvSpPr>
+          <p:cNvPr id="3" name="文本占位符 2"/>
           <p:cNvSpPr>
             <a:spLocks noGrp="1"/>
           </p:cNvSpPr>
@@ -1137,18 +993,13 @@
               <a:rPr kumimoji="1" lang="zh-CN" altLang="en-US"/>
               <a:t>单击此处编辑母版文本样式</a:t>
             </a:r>
-          </a:p>
-        </p:txBody>
-      </p:sp>
-      <p:sp>
-        <p:nvSpPr>
-          <p:cNvPr id="4" name="日期占位符 3">
-            <a:extLst>
-              <a:ext uri="{FF2B5EF4-FFF2-40B4-BE49-F238E27FC236}">
-                <a16:creationId xmlns:a16="http://schemas.microsoft.com/office/drawing/2014/main" id="{88A8D2BE-8AD5-F442-B41D-5F28F26B5EF9}"/>
-              </a:ext>
-            </a:extLst>
-          </p:cNvPr>
+            <a:endParaRPr kumimoji="1" lang="zh-CN" altLang="en-US"/>
+          </a:p>
+        </p:txBody>
+      </p:sp>
+      <p:sp>
+        <p:nvSpPr>
+          <p:cNvPr id="4" name="日期占位符 3"/>
           <p:cNvSpPr>
             <a:spLocks noGrp="1"/>
           </p:cNvSpPr>
@@ -1163,7 +1014,6 @@
           <a:p>
             <a:fld id="{9CA8AC9F-E80F-4C42-8A44-D918095D00A4}" type="datetimeFigureOut">
               <a:rPr kumimoji="1" lang="zh-CN" altLang="en-US" smtClean="0"/>
-              <a:t>2020/3/31</a:t>
             </a:fld>
             <a:endParaRPr kumimoji="1" lang="zh-CN" altLang="en-US"/>
           </a:p>
@@ -1171,13 +1021,7 @@
       </p:sp>
       <p:sp>
         <p:nvSpPr>
-          <p:cNvPr id="5" name="页脚占位符 4">
-            <a:extLst>
-              <a:ext uri="{FF2B5EF4-FFF2-40B4-BE49-F238E27FC236}">
-                <a16:creationId xmlns:a16="http://schemas.microsoft.com/office/drawing/2014/main" id="{B4E38536-DF00-F74A-A2F1-B428EB09964B}"/>
-              </a:ext>
-            </a:extLst>
-          </p:cNvPr>
+          <p:cNvPr id="5" name="页脚占位符 4"/>
           <p:cNvSpPr>
             <a:spLocks noGrp="1"/>
           </p:cNvSpPr>
@@ -1196,13 +1040,7 @@
       </p:sp>
       <p:sp>
         <p:nvSpPr>
-          <p:cNvPr id="6" name="灯片编号占位符 5">
-            <a:extLst>
-              <a:ext uri="{FF2B5EF4-FFF2-40B4-BE49-F238E27FC236}">
-                <a16:creationId xmlns:a16="http://schemas.microsoft.com/office/drawing/2014/main" id="{460B10DC-6E8C-B74D-BA7B-49082685BF97}"/>
-              </a:ext>
-            </a:extLst>
-          </p:cNvPr>
+          <p:cNvPr id="6" name="灯片编号占位符 5"/>
           <p:cNvSpPr>
             <a:spLocks noGrp="1"/>
           </p:cNvSpPr>
@@ -1217,18 +1055,12 @@
           <a:p>
             <a:fld id="{06A499BB-1C25-EA47-BDEA-EC5E7D61AD91}" type="slidenum">
               <a:rPr kumimoji="1" lang="zh-CN" altLang="en-US" smtClean="0"/>
-              <a:t>‹#›</a:t>
             </a:fld>
             <a:endParaRPr kumimoji="1" lang="zh-CN" altLang="en-US"/>
           </a:p>
         </p:txBody>
       </p:sp>
     </p:spTree>
-    <p:extLst>
-      <p:ext uri="{BB962C8B-B14F-4D97-AF65-F5344CB8AC3E}">
-        <p14:creationId xmlns:p14="http://schemas.microsoft.com/office/powerpoint/2010/main" val="448545869"/>
-      </p:ext>
-    </p:extLst>
   </p:cSld>
   <p:clrMapOvr>
     <a:masterClrMapping/>
@@ -1255,13 +1087,7 @@
       </p:grpSpPr>
       <p:sp>
         <p:nvSpPr>
-          <p:cNvPr id="2" name="标题 1">
-            <a:extLst>
-              <a:ext uri="{FF2B5EF4-FFF2-40B4-BE49-F238E27FC236}">
-                <a16:creationId xmlns:a16="http://schemas.microsoft.com/office/drawing/2014/main" id="{55ABBE8B-F3DF-4549-BC5E-9C0FD37DC988}"/>
-              </a:ext>
-            </a:extLst>
-          </p:cNvPr>
+          <p:cNvPr id="2" name="标题 1"/>
           <p:cNvSpPr>
             <a:spLocks noGrp="1"/>
           </p:cNvSpPr>
@@ -1278,18 +1104,13 @@
               <a:rPr kumimoji="1" lang="zh-CN" altLang="en-US"/>
               <a:t>单击此处编辑母版标题样式</a:t>
             </a:r>
-          </a:p>
-        </p:txBody>
-      </p:sp>
-      <p:sp>
-        <p:nvSpPr>
-          <p:cNvPr id="3" name="内容占位符 2">
-            <a:extLst>
-              <a:ext uri="{FF2B5EF4-FFF2-40B4-BE49-F238E27FC236}">
-                <a16:creationId xmlns:a16="http://schemas.microsoft.com/office/drawing/2014/main" id="{9043841E-E720-2B48-B771-1ADD161949E7}"/>
-              </a:ext>
-            </a:extLst>
-          </p:cNvPr>
+            <a:endParaRPr kumimoji="1" lang="zh-CN" altLang="en-US"/>
+          </a:p>
+        </p:txBody>
+      </p:sp>
+      <p:sp>
+        <p:nvSpPr>
+          <p:cNvPr id="3" name="内容占位符 2"/>
           <p:cNvSpPr>
             <a:spLocks noGrp="1"/>
           </p:cNvSpPr>
@@ -1312,6 +1133,7 @@
               <a:rPr kumimoji="1" lang="zh-CN" altLang="en-US"/>
               <a:t>单击此处编辑母版文本样式</a:t>
             </a:r>
+            <a:endParaRPr kumimoji="1" lang="zh-CN" altLang="en-US"/>
           </a:p>
           <a:p>
             <a:pPr lvl="1"/>
@@ -1319,6 +1141,7 @@
               <a:rPr kumimoji="1" lang="zh-CN" altLang="en-US"/>
               <a:t>二级</a:t>
             </a:r>
+            <a:endParaRPr kumimoji="1" lang="zh-CN" altLang="en-US"/>
           </a:p>
           <a:p>
             <a:pPr lvl="2"/>
@@ -1326,6 +1149,7 @@
               <a:rPr kumimoji="1" lang="zh-CN" altLang="en-US"/>
               <a:t>三级</a:t>
             </a:r>
+            <a:endParaRPr kumimoji="1" lang="zh-CN" altLang="en-US"/>
           </a:p>
           <a:p>
             <a:pPr lvl="3"/>
@@ -1333,6 +1157,7 @@
               <a:rPr kumimoji="1" lang="zh-CN" altLang="en-US"/>
               <a:t>四级</a:t>
             </a:r>
+            <a:endParaRPr kumimoji="1" lang="zh-CN" altLang="en-US"/>
           </a:p>
           <a:p>
             <a:pPr lvl="4"/>
@@ -1340,18 +1165,13 @@
               <a:rPr kumimoji="1" lang="zh-CN" altLang="en-US"/>
               <a:t>五级</a:t>
             </a:r>
-          </a:p>
-        </p:txBody>
-      </p:sp>
-      <p:sp>
-        <p:nvSpPr>
-          <p:cNvPr id="4" name="内容占位符 3">
-            <a:extLst>
-              <a:ext uri="{FF2B5EF4-FFF2-40B4-BE49-F238E27FC236}">
-                <a16:creationId xmlns:a16="http://schemas.microsoft.com/office/drawing/2014/main" id="{53C5FD91-83DE-CC40-A5E8-4E9CE0A97AA3}"/>
-              </a:ext>
-            </a:extLst>
-          </p:cNvPr>
+            <a:endParaRPr kumimoji="1" lang="zh-CN" altLang="en-US"/>
+          </a:p>
+        </p:txBody>
+      </p:sp>
+      <p:sp>
+        <p:nvSpPr>
+          <p:cNvPr id="4" name="内容占位符 3"/>
           <p:cNvSpPr>
             <a:spLocks noGrp="1"/>
           </p:cNvSpPr>
@@ -1374,6 +1194,7 @@
               <a:rPr kumimoji="1" lang="zh-CN" altLang="en-US"/>
               <a:t>单击此处编辑母版文本样式</a:t>
             </a:r>
+            <a:endParaRPr kumimoji="1" lang="zh-CN" altLang="en-US"/>
           </a:p>
           <a:p>
             <a:pPr lvl="1"/>
@@ -1381,6 +1202,7 @@
               <a:rPr kumimoji="1" lang="zh-CN" altLang="en-US"/>
               <a:t>二级</a:t>
             </a:r>
+            <a:endParaRPr kumimoji="1" lang="zh-CN" altLang="en-US"/>
           </a:p>
           <a:p>
             <a:pPr lvl="2"/>
@@ -1388,6 +1210,7 @@
               <a:rPr kumimoji="1" lang="zh-CN" altLang="en-US"/>
               <a:t>三级</a:t>
             </a:r>
+            <a:endParaRPr kumimoji="1" lang="zh-CN" altLang="en-US"/>
           </a:p>
           <a:p>
             <a:pPr lvl="3"/>
@@ -1395,6 +1218,7 @@
               <a:rPr kumimoji="1" lang="zh-CN" altLang="en-US"/>
               <a:t>四级</a:t>
             </a:r>
+            <a:endParaRPr kumimoji="1" lang="zh-CN" altLang="en-US"/>
           </a:p>
           <a:p>
             <a:pPr lvl="4"/>
@@ -1402,18 +1226,13 @@
               <a:rPr kumimoji="1" lang="zh-CN" altLang="en-US"/>
               <a:t>五级</a:t>
             </a:r>
-          </a:p>
-        </p:txBody>
-      </p:sp>
-      <p:sp>
-        <p:nvSpPr>
-          <p:cNvPr id="5" name="日期占位符 4">
-            <a:extLst>
-              <a:ext uri="{FF2B5EF4-FFF2-40B4-BE49-F238E27FC236}">
-                <a16:creationId xmlns:a16="http://schemas.microsoft.com/office/drawing/2014/main" id="{96D9471D-A344-3640-AB75-7DA78B9252AD}"/>
-              </a:ext>
-            </a:extLst>
-          </p:cNvPr>
+            <a:endParaRPr kumimoji="1" lang="zh-CN" altLang="en-US"/>
+          </a:p>
+        </p:txBody>
+      </p:sp>
+      <p:sp>
+        <p:nvSpPr>
+          <p:cNvPr id="5" name="日期占位符 4"/>
           <p:cNvSpPr>
             <a:spLocks noGrp="1"/>
           </p:cNvSpPr>
@@ -1428,7 +1247,6 @@
           <a:p>
             <a:fld id="{9CA8AC9F-E80F-4C42-8A44-D918095D00A4}" type="datetimeFigureOut">
               <a:rPr kumimoji="1" lang="zh-CN" altLang="en-US" smtClean="0"/>
-              <a:t>2020/3/31</a:t>
             </a:fld>
             <a:endParaRPr kumimoji="1" lang="zh-CN" altLang="en-US"/>
           </a:p>
@@ -1436,13 +1254,7 @@
       </p:sp>
       <p:sp>
         <p:nvSpPr>
-          <p:cNvPr id="6" name="页脚占位符 5">
-            <a:extLst>
-              <a:ext uri="{FF2B5EF4-FFF2-40B4-BE49-F238E27FC236}">
-                <a16:creationId xmlns:a16="http://schemas.microsoft.com/office/drawing/2014/main" id="{ADBDE6F8-1ED7-124C-8E8C-25EEEDCB7B15}"/>
-              </a:ext>
-            </a:extLst>
-          </p:cNvPr>
+          <p:cNvPr id="6" name="页脚占位符 5"/>
           <p:cNvSpPr>
             <a:spLocks noGrp="1"/>
           </p:cNvSpPr>
@@ -1461,13 +1273,7 @@
       </p:sp>
       <p:sp>
         <p:nvSpPr>
-          <p:cNvPr id="7" name="灯片编号占位符 6">
-            <a:extLst>
-              <a:ext uri="{FF2B5EF4-FFF2-40B4-BE49-F238E27FC236}">
-                <a16:creationId xmlns:a16="http://schemas.microsoft.com/office/drawing/2014/main" id="{BA660A38-1B84-F545-A36C-18E58218F47A}"/>
-              </a:ext>
-            </a:extLst>
-          </p:cNvPr>
+          <p:cNvPr id="7" name="灯片编号占位符 6"/>
           <p:cNvSpPr>
             <a:spLocks noGrp="1"/>
           </p:cNvSpPr>
@@ -1482,18 +1288,12 @@
           <a:p>
             <a:fld id="{06A499BB-1C25-EA47-BDEA-EC5E7D61AD91}" type="slidenum">
               <a:rPr kumimoji="1" lang="zh-CN" altLang="en-US" smtClean="0"/>
-              <a:t>‹#›</a:t>
             </a:fld>
             <a:endParaRPr kumimoji="1" lang="zh-CN" altLang="en-US"/>
           </a:p>
         </p:txBody>
       </p:sp>
     </p:spTree>
-    <p:extLst>
-      <p:ext uri="{BB962C8B-B14F-4D97-AF65-F5344CB8AC3E}">
-        <p14:creationId xmlns:p14="http://schemas.microsoft.com/office/powerpoint/2010/main" val="75189336"/>
-      </p:ext>
-    </p:extLst>
   </p:cSld>
   <p:clrMapOvr>
     <a:masterClrMapping/>
@@ -1520,13 +1320,7 @@
       </p:grpSpPr>
       <p:sp>
         <p:nvSpPr>
-          <p:cNvPr id="2" name="标题 1">
-            <a:extLst>
-              <a:ext uri="{FF2B5EF4-FFF2-40B4-BE49-F238E27FC236}">
-                <a16:creationId xmlns:a16="http://schemas.microsoft.com/office/drawing/2014/main" id="{7CAB5F2F-881C-9148-B153-3580BA985146}"/>
-              </a:ext>
-            </a:extLst>
-          </p:cNvPr>
+          <p:cNvPr id="2" name="标题 1"/>
           <p:cNvSpPr>
             <a:spLocks noGrp="1"/>
           </p:cNvSpPr>
@@ -1548,18 +1342,13 @@
               <a:rPr kumimoji="1" lang="zh-CN" altLang="en-US"/>
               <a:t>单击此处编辑母版标题样式</a:t>
             </a:r>
-          </a:p>
-        </p:txBody>
-      </p:sp>
-      <p:sp>
-        <p:nvSpPr>
-          <p:cNvPr id="3" name="文本占位符 2">
-            <a:extLst>
-              <a:ext uri="{FF2B5EF4-FFF2-40B4-BE49-F238E27FC236}">
-                <a16:creationId xmlns:a16="http://schemas.microsoft.com/office/drawing/2014/main" id="{96C7AF42-70D2-AD49-9187-54F8DECEA4F8}"/>
-              </a:ext>
-            </a:extLst>
-          </p:cNvPr>
+            <a:endParaRPr kumimoji="1" lang="zh-CN" altLang="en-US"/>
+          </a:p>
+        </p:txBody>
+      </p:sp>
+      <p:sp>
+        <p:nvSpPr>
+          <p:cNvPr id="3" name="文本占位符 2"/>
           <p:cNvSpPr>
             <a:spLocks noGrp="1"/>
           </p:cNvSpPr>
@@ -1619,18 +1408,13 @@
               <a:rPr kumimoji="1" lang="zh-CN" altLang="en-US"/>
               <a:t>单击此处编辑母版文本样式</a:t>
             </a:r>
-          </a:p>
-        </p:txBody>
-      </p:sp>
-      <p:sp>
-        <p:nvSpPr>
-          <p:cNvPr id="4" name="内容占位符 3">
-            <a:extLst>
-              <a:ext uri="{FF2B5EF4-FFF2-40B4-BE49-F238E27FC236}">
-                <a16:creationId xmlns:a16="http://schemas.microsoft.com/office/drawing/2014/main" id="{7D8DDB13-7BF9-0542-BF90-2158B751168E}"/>
-              </a:ext>
-            </a:extLst>
-          </p:cNvPr>
+            <a:endParaRPr kumimoji="1" lang="zh-CN" altLang="en-US"/>
+          </a:p>
+        </p:txBody>
+      </p:sp>
+      <p:sp>
+        <p:nvSpPr>
+          <p:cNvPr id="4" name="内容占位符 3"/>
           <p:cNvSpPr>
             <a:spLocks noGrp="1"/>
           </p:cNvSpPr>
@@ -1653,6 +1437,7 @@
               <a:rPr kumimoji="1" lang="zh-CN" altLang="en-US"/>
               <a:t>单击此处编辑母版文本样式</a:t>
             </a:r>
+            <a:endParaRPr kumimoji="1" lang="zh-CN" altLang="en-US"/>
           </a:p>
           <a:p>
             <a:pPr lvl="1"/>
@@ -1660,6 +1445,7 @@
               <a:rPr kumimoji="1" lang="zh-CN" altLang="en-US"/>
               <a:t>二级</a:t>
             </a:r>
+            <a:endParaRPr kumimoji="1" lang="zh-CN" altLang="en-US"/>
           </a:p>
           <a:p>
             <a:pPr lvl="2"/>
@@ -1667,6 +1453,7 @@
               <a:rPr kumimoji="1" lang="zh-CN" altLang="en-US"/>
               <a:t>三级</a:t>
             </a:r>
+            <a:endParaRPr kumimoji="1" lang="zh-CN" altLang="en-US"/>
           </a:p>
           <a:p>
             <a:pPr lvl="3"/>
@@ -1674,6 +1461,7 @@
               <a:rPr kumimoji="1" lang="zh-CN" altLang="en-US"/>
               <a:t>四级</a:t>
             </a:r>
+            <a:endParaRPr kumimoji="1" lang="zh-CN" altLang="en-US"/>
           </a:p>
           <a:p>
             <a:pPr lvl="4"/>
@@ -1681,18 +1469,13 @@
               <a:rPr kumimoji="1" lang="zh-CN" altLang="en-US"/>
               <a:t>五级</a:t>
             </a:r>
-          </a:p>
-        </p:txBody>
-      </p:sp>
-      <p:sp>
-        <p:nvSpPr>
-          <p:cNvPr id="5" name="文本占位符 4">
-            <a:extLst>
-              <a:ext uri="{FF2B5EF4-FFF2-40B4-BE49-F238E27FC236}">
-                <a16:creationId xmlns:a16="http://schemas.microsoft.com/office/drawing/2014/main" id="{0D544C0E-1A5F-8341-89C9-2DB9372E1C13}"/>
-              </a:ext>
-            </a:extLst>
-          </p:cNvPr>
+            <a:endParaRPr kumimoji="1" lang="zh-CN" altLang="en-US"/>
+          </a:p>
+        </p:txBody>
+      </p:sp>
+      <p:sp>
+        <p:nvSpPr>
+          <p:cNvPr id="5" name="文本占位符 4"/>
           <p:cNvSpPr>
             <a:spLocks noGrp="1"/>
           </p:cNvSpPr>
@@ -1752,18 +1535,13 @@
               <a:rPr kumimoji="1" lang="zh-CN" altLang="en-US"/>
               <a:t>单击此处编辑母版文本样式</a:t>
             </a:r>
-          </a:p>
-        </p:txBody>
-      </p:sp>
-      <p:sp>
-        <p:nvSpPr>
-          <p:cNvPr id="6" name="内容占位符 5">
-            <a:extLst>
-              <a:ext uri="{FF2B5EF4-FFF2-40B4-BE49-F238E27FC236}">
-                <a16:creationId xmlns:a16="http://schemas.microsoft.com/office/drawing/2014/main" id="{AB0C4646-1A07-8945-80F5-32110641DDFB}"/>
-              </a:ext>
-            </a:extLst>
-          </p:cNvPr>
+            <a:endParaRPr kumimoji="1" lang="zh-CN" altLang="en-US"/>
+          </a:p>
+        </p:txBody>
+      </p:sp>
+      <p:sp>
+        <p:nvSpPr>
+          <p:cNvPr id="6" name="内容占位符 5"/>
           <p:cNvSpPr>
             <a:spLocks noGrp="1"/>
           </p:cNvSpPr>
@@ -1786,6 +1564,7 @@
               <a:rPr kumimoji="1" lang="zh-CN" altLang="en-US"/>
               <a:t>单击此处编辑母版文本样式</a:t>
             </a:r>
+            <a:endParaRPr kumimoji="1" lang="zh-CN" altLang="en-US"/>
           </a:p>
           <a:p>
             <a:pPr lvl="1"/>
@@ -1793,6 +1572,7 @@
               <a:rPr kumimoji="1" lang="zh-CN" altLang="en-US"/>
               <a:t>二级</a:t>
             </a:r>
+            <a:endParaRPr kumimoji="1" lang="zh-CN" altLang="en-US"/>
           </a:p>
           <a:p>
             <a:pPr lvl="2"/>
@@ -1800,6 +1580,7 @@
               <a:rPr kumimoji="1" lang="zh-CN" altLang="en-US"/>
               <a:t>三级</a:t>
             </a:r>
+            <a:endParaRPr kumimoji="1" lang="zh-CN" altLang="en-US"/>
           </a:p>
           <a:p>
             <a:pPr lvl="3"/>
@@ -1807,6 +1588,7 @@
               <a:rPr kumimoji="1" lang="zh-CN" altLang="en-US"/>
               <a:t>四级</a:t>
             </a:r>
+            <a:endParaRPr kumimoji="1" lang="zh-CN" altLang="en-US"/>
           </a:p>
           <a:p>
             <a:pPr lvl="4"/>
@@ -1814,18 +1596,13 @@
               <a:rPr kumimoji="1" lang="zh-CN" altLang="en-US"/>
               <a:t>五级</a:t>
             </a:r>
-          </a:p>
-        </p:txBody>
-      </p:sp>
-      <p:sp>
-        <p:nvSpPr>
-          <p:cNvPr id="7" name="日期占位符 6">
-            <a:extLst>
-              <a:ext uri="{FF2B5EF4-FFF2-40B4-BE49-F238E27FC236}">
-                <a16:creationId xmlns:a16="http://schemas.microsoft.com/office/drawing/2014/main" id="{3BD62A1F-9F63-5E49-ACE1-F8B543DDF484}"/>
-              </a:ext>
-            </a:extLst>
-          </p:cNvPr>
+            <a:endParaRPr kumimoji="1" lang="zh-CN" altLang="en-US"/>
+          </a:p>
+        </p:txBody>
+      </p:sp>
+      <p:sp>
+        <p:nvSpPr>
+          <p:cNvPr id="7" name="日期占位符 6"/>
           <p:cNvSpPr>
             <a:spLocks noGrp="1"/>
           </p:cNvSpPr>
@@ -1840,7 +1617,6 @@
           <a:p>
             <a:fld id="{9CA8AC9F-E80F-4C42-8A44-D918095D00A4}" type="datetimeFigureOut">
               <a:rPr kumimoji="1" lang="zh-CN" altLang="en-US" smtClean="0"/>
-              <a:t>2020/3/31</a:t>
             </a:fld>
             <a:endParaRPr kumimoji="1" lang="zh-CN" altLang="en-US"/>
           </a:p>
@@ -1848,13 +1624,7 @@
       </p:sp>
       <p:sp>
         <p:nvSpPr>
-          <p:cNvPr id="8" name="页脚占位符 7">
-            <a:extLst>
-              <a:ext uri="{FF2B5EF4-FFF2-40B4-BE49-F238E27FC236}">
-                <a16:creationId xmlns:a16="http://schemas.microsoft.com/office/drawing/2014/main" id="{3E435B49-525A-1A4F-AABF-C211E186C7F4}"/>
-              </a:ext>
-            </a:extLst>
-          </p:cNvPr>
+          <p:cNvPr id="8" name="页脚占位符 7"/>
           <p:cNvSpPr>
             <a:spLocks noGrp="1"/>
           </p:cNvSpPr>
@@ -1873,13 +1643,7 @@
       </p:sp>
       <p:sp>
         <p:nvSpPr>
-          <p:cNvPr id="9" name="灯片编号占位符 8">
-            <a:extLst>
-              <a:ext uri="{FF2B5EF4-FFF2-40B4-BE49-F238E27FC236}">
-                <a16:creationId xmlns:a16="http://schemas.microsoft.com/office/drawing/2014/main" id="{10821CCB-6097-1747-81D2-37E6B1B14552}"/>
-              </a:ext>
-            </a:extLst>
-          </p:cNvPr>
+          <p:cNvPr id="9" name="灯片编号占位符 8"/>
           <p:cNvSpPr>
             <a:spLocks noGrp="1"/>
           </p:cNvSpPr>
@@ -1894,18 +1658,12 @@
           <a:p>
             <a:fld id="{06A499BB-1C25-EA47-BDEA-EC5E7D61AD91}" type="slidenum">
               <a:rPr kumimoji="1" lang="zh-CN" altLang="en-US" smtClean="0"/>
-              <a:t>‹#›</a:t>
             </a:fld>
             <a:endParaRPr kumimoji="1" lang="zh-CN" altLang="en-US"/>
           </a:p>
         </p:txBody>
       </p:sp>
     </p:spTree>
-    <p:extLst>
-      <p:ext uri="{BB962C8B-B14F-4D97-AF65-F5344CB8AC3E}">
-        <p14:creationId xmlns:p14="http://schemas.microsoft.com/office/powerpoint/2010/main" val="3095694091"/>
-      </p:ext>
-    </p:extLst>
   </p:cSld>
   <p:clrMapOvr>
     <a:masterClrMapping/>
@@ -1932,13 +1690,7 @@
       </p:grpSpPr>
       <p:sp>
         <p:nvSpPr>
-          <p:cNvPr id="2" name="标题 1">
-            <a:extLst>
-              <a:ext uri="{FF2B5EF4-FFF2-40B4-BE49-F238E27FC236}">
-                <a16:creationId xmlns:a16="http://schemas.microsoft.com/office/drawing/2014/main" id="{B8BB8F8B-9DD3-934E-A9DB-A8C217BACF1E}"/>
-              </a:ext>
-            </a:extLst>
-          </p:cNvPr>
+          <p:cNvPr id="2" name="标题 1"/>
           <p:cNvSpPr>
             <a:spLocks noGrp="1"/>
           </p:cNvSpPr>
@@ -1955,18 +1707,13 @@
               <a:rPr kumimoji="1" lang="zh-CN" altLang="en-US"/>
               <a:t>单击此处编辑母版标题样式</a:t>
             </a:r>
-          </a:p>
-        </p:txBody>
-      </p:sp>
-      <p:sp>
-        <p:nvSpPr>
-          <p:cNvPr id="3" name="日期占位符 2">
-            <a:extLst>
-              <a:ext uri="{FF2B5EF4-FFF2-40B4-BE49-F238E27FC236}">
-                <a16:creationId xmlns:a16="http://schemas.microsoft.com/office/drawing/2014/main" id="{AD0C4DA5-D0D1-4F42-9DAE-5A551530FB70}"/>
-              </a:ext>
-            </a:extLst>
-          </p:cNvPr>
+            <a:endParaRPr kumimoji="1" lang="zh-CN" altLang="en-US"/>
+          </a:p>
+        </p:txBody>
+      </p:sp>
+      <p:sp>
+        <p:nvSpPr>
+          <p:cNvPr id="3" name="日期占位符 2"/>
           <p:cNvSpPr>
             <a:spLocks noGrp="1"/>
           </p:cNvSpPr>
@@ -1981,7 +1728,6 @@
           <a:p>
             <a:fld id="{9CA8AC9F-E80F-4C42-8A44-D918095D00A4}" type="datetimeFigureOut">
               <a:rPr kumimoji="1" lang="zh-CN" altLang="en-US" smtClean="0"/>
-              <a:t>2020/3/31</a:t>
             </a:fld>
             <a:endParaRPr kumimoji="1" lang="zh-CN" altLang="en-US"/>
           </a:p>
@@ -1989,13 +1735,7 @@
       </p:sp>
       <p:sp>
         <p:nvSpPr>
-          <p:cNvPr id="4" name="页脚占位符 3">
-            <a:extLst>
-              <a:ext uri="{FF2B5EF4-FFF2-40B4-BE49-F238E27FC236}">
-                <a16:creationId xmlns:a16="http://schemas.microsoft.com/office/drawing/2014/main" id="{1AA83A48-F658-7D4F-9F56-ED56A11E4DF6}"/>
-              </a:ext>
-            </a:extLst>
-          </p:cNvPr>
+          <p:cNvPr id="4" name="页脚占位符 3"/>
           <p:cNvSpPr>
             <a:spLocks noGrp="1"/>
           </p:cNvSpPr>
@@ -2014,13 +1754,7 @@
       </p:sp>
       <p:sp>
         <p:nvSpPr>
-          <p:cNvPr id="5" name="灯片编号占位符 4">
-            <a:extLst>
-              <a:ext uri="{FF2B5EF4-FFF2-40B4-BE49-F238E27FC236}">
-                <a16:creationId xmlns:a16="http://schemas.microsoft.com/office/drawing/2014/main" id="{A4640897-0873-E541-BE20-0C2A881B2229}"/>
-              </a:ext>
-            </a:extLst>
-          </p:cNvPr>
+          <p:cNvPr id="5" name="灯片编号占位符 4"/>
           <p:cNvSpPr>
             <a:spLocks noGrp="1"/>
           </p:cNvSpPr>
@@ -2035,18 +1769,12 @@
           <a:p>
             <a:fld id="{06A499BB-1C25-EA47-BDEA-EC5E7D61AD91}" type="slidenum">
               <a:rPr kumimoji="1" lang="zh-CN" altLang="en-US" smtClean="0"/>
-              <a:t>‹#›</a:t>
             </a:fld>
             <a:endParaRPr kumimoji="1" lang="zh-CN" altLang="en-US"/>
           </a:p>
         </p:txBody>
       </p:sp>
     </p:spTree>
-    <p:extLst>
-      <p:ext uri="{BB962C8B-B14F-4D97-AF65-F5344CB8AC3E}">
-        <p14:creationId xmlns:p14="http://schemas.microsoft.com/office/powerpoint/2010/main" val="3221482397"/>
-      </p:ext>
-    </p:extLst>
   </p:cSld>
   <p:clrMapOvr>
     <a:masterClrMapping/>
@@ -2073,13 +1801,7 @@
       </p:grpSpPr>
       <p:sp>
         <p:nvSpPr>
-          <p:cNvPr id="2" name="日期占位符 1">
-            <a:extLst>
-              <a:ext uri="{FF2B5EF4-FFF2-40B4-BE49-F238E27FC236}">
-                <a16:creationId xmlns:a16="http://schemas.microsoft.com/office/drawing/2014/main" id="{F07BF2D0-54EE-3940-9DB5-F5B67FD9FC76}"/>
-              </a:ext>
-            </a:extLst>
-          </p:cNvPr>
+          <p:cNvPr id="2" name="日期占位符 1"/>
           <p:cNvSpPr>
             <a:spLocks noGrp="1"/>
           </p:cNvSpPr>
@@ -2094,7 +1816,6 @@
           <a:p>
             <a:fld id="{9CA8AC9F-E80F-4C42-8A44-D918095D00A4}" type="datetimeFigureOut">
               <a:rPr kumimoji="1" lang="zh-CN" altLang="en-US" smtClean="0"/>
-              <a:t>2020/3/31</a:t>
             </a:fld>
             <a:endParaRPr kumimoji="1" lang="zh-CN" altLang="en-US"/>
           </a:p>
@@ -2102,13 +1823,7 @@
       </p:sp>
       <p:sp>
         <p:nvSpPr>
-          <p:cNvPr id="3" name="页脚占位符 2">
-            <a:extLst>
-              <a:ext uri="{FF2B5EF4-FFF2-40B4-BE49-F238E27FC236}">
-                <a16:creationId xmlns:a16="http://schemas.microsoft.com/office/drawing/2014/main" id="{E2BC8300-F2F9-DB45-8F5A-42F17548D628}"/>
-              </a:ext>
-            </a:extLst>
-          </p:cNvPr>
+          <p:cNvPr id="3" name="页脚占位符 2"/>
           <p:cNvSpPr>
             <a:spLocks noGrp="1"/>
           </p:cNvSpPr>
@@ -2127,13 +1842,7 @@
       </p:sp>
       <p:sp>
         <p:nvSpPr>
-          <p:cNvPr id="4" name="灯片编号占位符 3">
-            <a:extLst>
-              <a:ext uri="{FF2B5EF4-FFF2-40B4-BE49-F238E27FC236}">
-                <a16:creationId xmlns:a16="http://schemas.microsoft.com/office/drawing/2014/main" id="{0B86E78C-3250-BC45-B051-E82000EB4CE7}"/>
-              </a:ext>
-            </a:extLst>
-          </p:cNvPr>
+          <p:cNvPr id="4" name="灯片编号占位符 3"/>
           <p:cNvSpPr>
             <a:spLocks noGrp="1"/>
           </p:cNvSpPr>
@@ -2148,18 +1857,12 @@
           <a:p>
             <a:fld id="{06A499BB-1C25-EA47-BDEA-EC5E7D61AD91}" type="slidenum">
               <a:rPr kumimoji="1" lang="zh-CN" altLang="en-US" smtClean="0"/>
-              <a:t>‹#›</a:t>
             </a:fld>
             <a:endParaRPr kumimoji="1" lang="zh-CN" altLang="en-US"/>
           </a:p>
         </p:txBody>
       </p:sp>
     </p:spTree>
-    <p:extLst>
-      <p:ext uri="{BB962C8B-B14F-4D97-AF65-F5344CB8AC3E}">
-        <p14:creationId xmlns:p14="http://schemas.microsoft.com/office/powerpoint/2010/main" val="3693695750"/>
-      </p:ext>
-    </p:extLst>
   </p:cSld>
   <p:clrMapOvr>
     <a:masterClrMapping/>
@@ -2186,13 +1889,7 @@
       </p:grpSpPr>
       <p:sp>
         <p:nvSpPr>
-          <p:cNvPr id="2" name="标题 1">
-            <a:extLst>
-              <a:ext uri="{FF2B5EF4-FFF2-40B4-BE49-F238E27FC236}">
-                <a16:creationId xmlns:a16="http://schemas.microsoft.com/office/drawing/2014/main" id="{DB0029D1-C15A-EE49-89CD-91062F18E075}"/>
-              </a:ext>
-            </a:extLst>
-          </p:cNvPr>
+          <p:cNvPr id="2" name="标题 1"/>
           <p:cNvSpPr>
             <a:spLocks noGrp="1"/>
           </p:cNvSpPr>
@@ -2218,18 +1915,13 @@
               <a:rPr kumimoji="1" lang="zh-CN" altLang="en-US"/>
               <a:t>单击此处编辑母版标题样式</a:t>
             </a:r>
-          </a:p>
-        </p:txBody>
-      </p:sp>
-      <p:sp>
-        <p:nvSpPr>
-          <p:cNvPr id="3" name="内容占位符 2">
-            <a:extLst>
-              <a:ext uri="{FF2B5EF4-FFF2-40B4-BE49-F238E27FC236}">
-                <a16:creationId xmlns:a16="http://schemas.microsoft.com/office/drawing/2014/main" id="{0AF75C49-7111-FA4E-AF49-475A241DCBC0}"/>
-              </a:ext>
-            </a:extLst>
-          </p:cNvPr>
+            <a:endParaRPr kumimoji="1" lang="zh-CN" altLang="en-US"/>
+          </a:p>
+        </p:txBody>
+      </p:sp>
+      <p:sp>
+        <p:nvSpPr>
+          <p:cNvPr id="3" name="内容占位符 2"/>
           <p:cNvSpPr>
             <a:spLocks noGrp="1"/>
           </p:cNvSpPr>
@@ -2280,6 +1972,7 @@
               <a:rPr kumimoji="1" lang="zh-CN" altLang="en-US"/>
               <a:t>单击此处编辑母版文本样式</a:t>
             </a:r>
+            <a:endParaRPr kumimoji="1" lang="zh-CN" altLang="en-US"/>
           </a:p>
           <a:p>
             <a:pPr lvl="1"/>
@@ -2287,6 +1980,7 @@
               <a:rPr kumimoji="1" lang="zh-CN" altLang="en-US"/>
               <a:t>二级</a:t>
             </a:r>
+            <a:endParaRPr kumimoji="1" lang="zh-CN" altLang="en-US"/>
           </a:p>
           <a:p>
             <a:pPr lvl="2"/>
@@ -2294,6 +1988,7 @@
               <a:rPr kumimoji="1" lang="zh-CN" altLang="en-US"/>
               <a:t>三级</a:t>
             </a:r>
+            <a:endParaRPr kumimoji="1" lang="zh-CN" altLang="en-US"/>
           </a:p>
           <a:p>
             <a:pPr lvl="3"/>
@@ -2301,6 +1996,7 @@
               <a:rPr kumimoji="1" lang="zh-CN" altLang="en-US"/>
               <a:t>四级</a:t>
             </a:r>
+            <a:endParaRPr kumimoji="1" lang="zh-CN" altLang="en-US"/>
           </a:p>
           <a:p>
             <a:pPr lvl="4"/>
@@ -2308,18 +2004,13 @@
               <a:rPr kumimoji="1" lang="zh-CN" altLang="en-US"/>
               <a:t>五级</a:t>
             </a:r>
-          </a:p>
-        </p:txBody>
-      </p:sp>
-      <p:sp>
-        <p:nvSpPr>
-          <p:cNvPr id="4" name="文本占位符 3">
-            <a:extLst>
-              <a:ext uri="{FF2B5EF4-FFF2-40B4-BE49-F238E27FC236}">
-                <a16:creationId xmlns:a16="http://schemas.microsoft.com/office/drawing/2014/main" id="{4987C051-30CD-DA47-AC52-5CFF0C77B751}"/>
-              </a:ext>
-            </a:extLst>
-          </p:cNvPr>
+            <a:endParaRPr kumimoji="1" lang="zh-CN" altLang="en-US"/>
+          </a:p>
+        </p:txBody>
+      </p:sp>
+      <p:sp>
+        <p:nvSpPr>
+          <p:cNvPr id="4" name="文本占位符 3"/>
           <p:cNvSpPr>
             <a:spLocks noGrp="1"/>
           </p:cNvSpPr>
@@ -2379,18 +2070,13 @@
               <a:rPr kumimoji="1" lang="zh-CN" altLang="en-US"/>
               <a:t>单击此处编辑母版文本样式</a:t>
             </a:r>
-          </a:p>
-        </p:txBody>
-      </p:sp>
-      <p:sp>
-        <p:nvSpPr>
-          <p:cNvPr id="5" name="日期占位符 4">
-            <a:extLst>
-              <a:ext uri="{FF2B5EF4-FFF2-40B4-BE49-F238E27FC236}">
-                <a16:creationId xmlns:a16="http://schemas.microsoft.com/office/drawing/2014/main" id="{C8203AA0-434A-F14B-8E59-9AB4F845BF1D}"/>
-              </a:ext>
-            </a:extLst>
-          </p:cNvPr>
+            <a:endParaRPr kumimoji="1" lang="zh-CN" altLang="en-US"/>
+          </a:p>
+        </p:txBody>
+      </p:sp>
+      <p:sp>
+        <p:nvSpPr>
+          <p:cNvPr id="5" name="日期占位符 4"/>
           <p:cNvSpPr>
             <a:spLocks noGrp="1"/>
           </p:cNvSpPr>
@@ -2405,7 +2091,6 @@
           <a:p>
             <a:fld id="{9CA8AC9F-E80F-4C42-8A44-D918095D00A4}" type="datetimeFigureOut">
               <a:rPr kumimoji="1" lang="zh-CN" altLang="en-US" smtClean="0"/>
-              <a:t>2020/3/31</a:t>
             </a:fld>
             <a:endParaRPr kumimoji="1" lang="zh-CN" altLang="en-US"/>
           </a:p>
@@ -2413,13 +2098,7 @@
       </p:sp>
       <p:sp>
         <p:nvSpPr>
-          <p:cNvPr id="6" name="页脚占位符 5">
-            <a:extLst>
-              <a:ext uri="{FF2B5EF4-FFF2-40B4-BE49-F238E27FC236}">
-                <a16:creationId xmlns:a16="http://schemas.microsoft.com/office/drawing/2014/main" id="{7DB5126D-6219-2D42-9F8A-99C7DC28A909}"/>
-              </a:ext>
-            </a:extLst>
-          </p:cNvPr>
+          <p:cNvPr id="6" name="页脚占位符 5"/>
           <p:cNvSpPr>
             <a:spLocks noGrp="1"/>
           </p:cNvSpPr>
@@ -2438,13 +2117,7 @@
       </p:sp>
       <p:sp>
         <p:nvSpPr>
-          <p:cNvPr id="7" name="灯片编号占位符 6">
-            <a:extLst>
-              <a:ext uri="{FF2B5EF4-FFF2-40B4-BE49-F238E27FC236}">
-                <a16:creationId xmlns:a16="http://schemas.microsoft.com/office/drawing/2014/main" id="{84448BD6-1F86-1E41-8F78-00005BD79285}"/>
-              </a:ext>
-            </a:extLst>
-          </p:cNvPr>
+          <p:cNvPr id="7" name="灯片编号占位符 6"/>
           <p:cNvSpPr>
             <a:spLocks noGrp="1"/>
           </p:cNvSpPr>
@@ -2459,18 +2132,12 @@
           <a:p>
             <a:fld id="{06A499BB-1C25-EA47-BDEA-EC5E7D61AD91}" type="slidenum">
               <a:rPr kumimoji="1" lang="zh-CN" altLang="en-US" smtClean="0"/>
-              <a:t>‹#›</a:t>
             </a:fld>
             <a:endParaRPr kumimoji="1" lang="zh-CN" altLang="en-US"/>
           </a:p>
         </p:txBody>
       </p:sp>
     </p:spTree>
-    <p:extLst>
-      <p:ext uri="{BB962C8B-B14F-4D97-AF65-F5344CB8AC3E}">
-        <p14:creationId xmlns:p14="http://schemas.microsoft.com/office/powerpoint/2010/main" val="66427712"/>
-      </p:ext>
-    </p:extLst>
   </p:cSld>
   <p:clrMapOvr>
     <a:masterClrMapping/>
@@ -2497,13 +2164,7 @@
       </p:grpSpPr>
       <p:sp>
         <p:nvSpPr>
-          <p:cNvPr id="2" name="标题 1">
-            <a:extLst>
-              <a:ext uri="{FF2B5EF4-FFF2-40B4-BE49-F238E27FC236}">
-                <a16:creationId xmlns:a16="http://schemas.microsoft.com/office/drawing/2014/main" id="{D370C2FD-4978-7B41-A3A8-DEB57CC5DF7F}"/>
-              </a:ext>
-            </a:extLst>
-          </p:cNvPr>
+          <p:cNvPr id="2" name="标题 1"/>
           <p:cNvSpPr>
             <a:spLocks noGrp="1"/>
           </p:cNvSpPr>
@@ -2529,18 +2190,13 @@
               <a:rPr kumimoji="1" lang="zh-CN" altLang="en-US"/>
               <a:t>单击此处编辑母版标题样式</a:t>
             </a:r>
-          </a:p>
-        </p:txBody>
-      </p:sp>
-      <p:sp>
-        <p:nvSpPr>
-          <p:cNvPr id="3" name="图片占位符 2">
-            <a:extLst>
-              <a:ext uri="{FF2B5EF4-FFF2-40B4-BE49-F238E27FC236}">
-                <a16:creationId xmlns:a16="http://schemas.microsoft.com/office/drawing/2014/main" id="{E2BD0D55-D45F-1F4C-9163-9CF684D91512}"/>
-              </a:ext>
-            </a:extLst>
-          </p:cNvPr>
+            <a:endParaRPr kumimoji="1" lang="zh-CN" altLang="en-US"/>
+          </a:p>
+        </p:txBody>
+      </p:sp>
+      <p:sp>
+        <p:nvSpPr>
+          <p:cNvPr id="3" name="图片占位符 2"/>
           <p:cNvSpPr>
             <a:spLocks noGrp="1"/>
           </p:cNvSpPr>
@@ -2601,13 +2257,7 @@
       </p:sp>
       <p:sp>
         <p:nvSpPr>
-          <p:cNvPr id="4" name="文本占位符 3">
-            <a:extLst>
-              <a:ext uri="{FF2B5EF4-FFF2-40B4-BE49-F238E27FC236}">
-                <a16:creationId xmlns:a16="http://schemas.microsoft.com/office/drawing/2014/main" id="{0CF511F5-3225-DD45-82D2-E4FE59B702DD}"/>
-              </a:ext>
-            </a:extLst>
-          </p:cNvPr>
+          <p:cNvPr id="4" name="文本占位符 3"/>
           <p:cNvSpPr>
             <a:spLocks noGrp="1"/>
           </p:cNvSpPr>
@@ -2667,18 +2317,13 @@
               <a:rPr kumimoji="1" lang="zh-CN" altLang="en-US"/>
               <a:t>单击此处编辑母版文本样式</a:t>
             </a:r>
-          </a:p>
-        </p:txBody>
-      </p:sp>
-      <p:sp>
-        <p:nvSpPr>
-          <p:cNvPr id="5" name="日期占位符 4">
-            <a:extLst>
-              <a:ext uri="{FF2B5EF4-FFF2-40B4-BE49-F238E27FC236}">
-                <a16:creationId xmlns:a16="http://schemas.microsoft.com/office/drawing/2014/main" id="{146234B3-8FE5-464F-989B-6C675F57ED0A}"/>
-              </a:ext>
-            </a:extLst>
-          </p:cNvPr>
+            <a:endParaRPr kumimoji="1" lang="zh-CN" altLang="en-US"/>
+          </a:p>
+        </p:txBody>
+      </p:sp>
+      <p:sp>
+        <p:nvSpPr>
+          <p:cNvPr id="5" name="日期占位符 4"/>
           <p:cNvSpPr>
             <a:spLocks noGrp="1"/>
           </p:cNvSpPr>
@@ -2693,7 +2338,6 @@
           <a:p>
             <a:fld id="{9CA8AC9F-E80F-4C42-8A44-D918095D00A4}" type="datetimeFigureOut">
               <a:rPr kumimoji="1" lang="zh-CN" altLang="en-US" smtClean="0"/>
-              <a:t>2020/3/31</a:t>
             </a:fld>
             <a:endParaRPr kumimoji="1" lang="zh-CN" altLang="en-US"/>
           </a:p>
@@ -2701,13 +2345,7 @@
       </p:sp>
       <p:sp>
         <p:nvSpPr>
-          <p:cNvPr id="6" name="页脚占位符 5">
-            <a:extLst>
-              <a:ext uri="{FF2B5EF4-FFF2-40B4-BE49-F238E27FC236}">
-                <a16:creationId xmlns:a16="http://schemas.microsoft.com/office/drawing/2014/main" id="{5E4E38AE-CA14-B54F-9AC1-CDE859D8B6F7}"/>
-              </a:ext>
-            </a:extLst>
-          </p:cNvPr>
+          <p:cNvPr id="6" name="页脚占位符 5"/>
           <p:cNvSpPr>
             <a:spLocks noGrp="1"/>
           </p:cNvSpPr>
@@ -2726,13 +2364,7 @@
       </p:sp>
       <p:sp>
         <p:nvSpPr>
-          <p:cNvPr id="7" name="灯片编号占位符 6">
-            <a:extLst>
-              <a:ext uri="{FF2B5EF4-FFF2-40B4-BE49-F238E27FC236}">
-                <a16:creationId xmlns:a16="http://schemas.microsoft.com/office/drawing/2014/main" id="{A7DE2888-8450-F14E-BB84-ABAB27504579}"/>
-              </a:ext>
-            </a:extLst>
-          </p:cNvPr>
+          <p:cNvPr id="7" name="灯片编号占位符 6"/>
           <p:cNvSpPr>
             <a:spLocks noGrp="1"/>
           </p:cNvSpPr>
@@ -2747,18 +2379,12 @@
           <a:p>
             <a:fld id="{06A499BB-1C25-EA47-BDEA-EC5E7D61AD91}" type="slidenum">
               <a:rPr kumimoji="1" lang="zh-CN" altLang="en-US" smtClean="0"/>
-              <a:t>‹#›</a:t>
             </a:fld>
             <a:endParaRPr kumimoji="1" lang="zh-CN" altLang="en-US"/>
           </a:p>
         </p:txBody>
       </p:sp>
     </p:spTree>
-    <p:extLst>
-      <p:ext uri="{BB962C8B-B14F-4D97-AF65-F5344CB8AC3E}">
-        <p14:creationId xmlns:p14="http://schemas.microsoft.com/office/powerpoint/2010/main" val="2232427602"/>
-      </p:ext>
-    </p:extLst>
   </p:cSld>
   <p:clrMapOvr>
     <a:masterClrMapping/>
@@ -2790,13 +2416,7 @@
       </p:grpSpPr>
       <p:sp>
         <p:nvSpPr>
-          <p:cNvPr id="2" name="标题占位符 1">
-            <a:extLst>
-              <a:ext uri="{FF2B5EF4-FFF2-40B4-BE49-F238E27FC236}">
-                <a16:creationId xmlns:a16="http://schemas.microsoft.com/office/drawing/2014/main" id="{3AC5EBC9-A71F-034B-B507-1DE1A15BC468}"/>
-              </a:ext>
-            </a:extLst>
-          </p:cNvPr>
+          <p:cNvPr id="2" name="标题占位符 1"/>
           <p:cNvSpPr>
             <a:spLocks noGrp="1"/>
           </p:cNvSpPr>
@@ -2823,18 +2443,13 @@
               <a:rPr kumimoji="1" lang="zh-CN" altLang="en-US"/>
               <a:t>单击此处编辑母版标题样式</a:t>
             </a:r>
-          </a:p>
-        </p:txBody>
-      </p:sp>
-      <p:sp>
-        <p:nvSpPr>
-          <p:cNvPr id="3" name="文本占位符 2">
-            <a:extLst>
-              <a:ext uri="{FF2B5EF4-FFF2-40B4-BE49-F238E27FC236}">
-                <a16:creationId xmlns:a16="http://schemas.microsoft.com/office/drawing/2014/main" id="{AA5E7D5F-54C4-B042-B6E2-2D982AA79E7D}"/>
-              </a:ext>
-            </a:extLst>
-          </p:cNvPr>
+            <a:endParaRPr kumimoji="1" lang="zh-CN" altLang="en-US"/>
+          </a:p>
+        </p:txBody>
+      </p:sp>
+      <p:sp>
+        <p:nvSpPr>
+          <p:cNvPr id="3" name="文本占位符 2"/>
           <p:cNvSpPr>
             <a:spLocks noGrp="1"/>
           </p:cNvSpPr>
@@ -2862,6 +2477,7 @@
               <a:rPr kumimoji="1" lang="zh-CN" altLang="en-US"/>
               <a:t>单击此处编辑母版文本样式</a:t>
             </a:r>
+            <a:endParaRPr kumimoji="1" lang="zh-CN" altLang="en-US"/>
           </a:p>
           <a:p>
             <a:pPr lvl="1"/>
@@ -2869,6 +2485,7 @@
               <a:rPr kumimoji="1" lang="zh-CN" altLang="en-US"/>
               <a:t>二级</a:t>
             </a:r>
+            <a:endParaRPr kumimoji="1" lang="zh-CN" altLang="en-US"/>
           </a:p>
           <a:p>
             <a:pPr lvl="2"/>
@@ -2876,6 +2493,7 @@
               <a:rPr kumimoji="1" lang="zh-CN" altLang="en-US"/>
               <a:t>三级</a:t>
             </a:r>
+            <a:endParaRPr kumimoji="1" lang="zh-CN" altLang="en-US"/>
           </a:p>
           <a:p>
             <a:pPr lvl="3"/>
@@ -2883,6 +2501,7 @@
               <a:rPr kumimoji="1" lang="zh-CN" altLang="en-US"/>
               <a:t>四级</a:t>
             </a:r>
+            <a:endParaRPr kumimoji="1" lang="zh-CN" altLang="en-US"/>
           </a:p>
           <a:p>
             <a:pPr lvl="4"/>
@@ -2890,18 +2509,13 @@
               <a:rPr kumimoji="1" lang="zh-CN" altLang="en-US"/>
               <a:t>五级</a:t>
             </a:r>
-          </a:p>
-        </p:txBody>
-      </p:sp>
-      <p:sp>
-        <p:nvSpPr>
-          <p:cNvPr id="4" name="日期占位符 3">
-            <a:extLst>
-              <a:ext uri="{FF2B5EF4-FFF2-40B4-BE49-F238E27FC236}">
-                <a16:creationId xmlns:a16="http://schemas.microsoft.com/office/drawing/2014/main" id="{6B2B9C98-CED2-544F-BD07-5309215D6ABB}"/>
-              </a:ext>
-            </a:extLst>
-          </p:cNvPr>
+            <a:endParaRPr kumimoji="1" lang="zh-CN" altLang="en-US"/>
+          </a:p>
+        </p:txBody>
+      </p:sp>
+      <p:sp>
+        <p:nvSpPr>
+          <p:cNvPr id="4" name="日期占位符 3"/>
           <p:cNvSpPr>
             <a:spLocks noGrp="1"/>
           </p:cNvSpPr>
@@ -2934,7 +2548,6 @@
           <a:p>
             <a:fld id="{9CA8AC9F-E80F-4C42-8A44-D918095D00A4}" type="datetimeFigureOut">
               <a:rPr kumimoji="1" lang="zh-CN" altLang="en-US" smtClean="0"/>
-              <a:t>2020/3/31</a:t>
             </a:fld>
             <a:endParaRPr kumimoji="1" lang="zh-CN" altLang="en-US"/>
           </a:p>
@@ -2942,13 +2555,7 @@
       </p:sp>
       <p:sp>
         <p:nvSpPr>
-          <p:cNvPr id="5" name="页脚占位符 4">
-            <a:extLst>
-              <a:ext uri="{FF2B5EF4-FFF2-40B4-BE49-F238E27FC236}">
-                <a16:creationId xmlns:a16="http://schemas.microsoft.com/office/drawing/2014/main" id="{A81AC95B-C7FB-AC44-AFE7-CE4BA4CEF795}"/>
-              </a:ext>
-            </a:extLst>
-          </p:cNvPr>
+          <p:cNvPr id="5" name="页脚占位符 4"/>
           <p:cNvSpPr>
             <a:spLocks noGrp="1"/>
           </p:cNvSpPr>
@@ -2985,13 +2592,7 @@
       </p:sp>
       <p:sp>
         <p:nvSpPr>
-          <p:cNvPr id="6" name="灯片编号占位符 5">
-            <a:extLst>
-              <a:ext uri="{FF2B5EF4-FFF2-40B4-BE49-F238E27FC236}">
-                <a16:creationId xmlns:a16="http://schemas.microsoft.com/office/drawing/2014/main" id="{D0F97426-4A33-9B45-97CB-1FD81C9BAA71}"/>
-              </a:ext>
-            </a:extLst>
-          </p:cNvPr>
+          <p:cNvPr id="6" name="灯片编号占位符 5"/>
           <p:cNvSpPr>
             <a:spLocks noGrp="1"/>
           </p:cNvSpPr>
@@ -3024,18 +2625,12 @@
           <a:p>
             <a:fld id="{06A499BB-1C25-EA47-BDEA-EC5E7D61AD91}" type="slidenum">
               <a:rPr kumimoji="1" lang="zh-CN" altLang="en-US" smtClean="0"/>
-              <a:t>‹#›</a:t>
             </a:fld>
             <a:endParaRPr kumimoji="1" lang="zh-CN" altLang="en-US"/>
           </a:p>
         </p:txBody>
       </p:sp>
     </p:spTree>
-    <p:extLst>
-      <p:ext uri="{BB962C8B-B14F-4D97-AF65-F5344CB8AC3E}">
-        <p14:creationId xmlns:p14="http://schemas.microsoft.com/office/powerpoint/2010/main" val="703732842"/>
-      </p:ext>
-    </p:extLst>
   </p:cSld>
   <p:clrMap bg1="lt1" tx1="dk1" bg2="lt2" tx2="dk2" accent1="accent1" accent2="accent2" accent3="accent3" accent4="accent4" accent5="accent5" accent6="accent6" hlink="hlink" folHlink="folHlink"/>
   <p:sldLayoutIdLst>
@@ -3079,7 +2674,7 @@
         <a:spcBef>
           <a:spcPts val="1000"/>
         </a:spcBef>
-        <a:buFont typeface="Arial" panose="020B0604020202020204" pitchFamily="34" charset="0"/>
+        <a:buFont typeface="Arial" panose="020B0604020202090204" pitchFamily="34" charset="0"/>
         <a:buChar char="•"/>
         <a:defRPr sz="2800" kern="1200">
           <a:solidFill>
@@ -3097,7 +2692,7 @@
         <a:spcBef>
           <a:spcPts val="500"/>
         </a:spcBef>
-        <a:buFont typeface="Arial" panose="020B0604020202020204" pitchFamily="34" charset="0"/>
+        <a:buFont typeface="Arial" panose="020B0604020202090204" pitchFamily="34" charset="0"/>
         <a:buChar char="•"/>
         <a:defRPr sz="2400" kern="1200">
           <a:solidFill>
@@ -3115,7 +2710,7 @@
         <a:spcBef>
           <a:spcPts val="500"/>
         </a:spcBef>
-        <a:buFont typeface="Arial" panose="020B0604020202020204" pitchFamily="34" charset="0"/>
+        <a:buFont typeface="Arial" panose="020B0604020202090204" pitchFamily="34" charset="0"/>
         <a:buChar char="•"/>
         <a:defRPr sz="2000" kern="1200">
           <a:solidFill>
@@ -3133,7 +2728,7 @@
         <a:spcBef>
           <a:spcPts val="500"/>
         </a:spcBef>
-        <a:buFont typeface="Arial" panose="020B0604020202020204" pitchFamily="34" charset="0"/>
+        <a:buFont typeface="Arial" panose="020B0604020202090204" pitchFamily="34" charset="0"/>
         <a:buChar char="•"/>
         <a:defRPr sz="1800" kern="1200">
           <a:solidFill>
@@ -3151,7 +2746,7 @@
         <a:spcBef>
           <a:spcPts val="500"/>
         </a:spcBef>
-        <a:buFont typeface="Arial" panose="020B0604020202020204" pitchFamily="34" charset="0"/>
+        <a:buFont typeface="Arial" panose="020B0604020202090204" pitchFamily="34" charset="0"/>
         <a:buChar char="•"/>
         <a:defRPr sz="1800" kern="1200">
           <a:solidFill>
@@ -3169,7 +2764,7 @@
         <a:spcBef>
           <a:spcPts val="500"/>
         </a:spcBef>
-        <a:buFont typeface="Arial" panose="020B0604020202020204" pitchFamily="34" charset="0"/>
+        <a:buFont typeface="Arial" panose="020B0604020202090204" pitchFamily="34" charset="0"/>
         <a:buChar char="•"/>
         <a:defRPr sz="1800" kern="1200">
           <a:solidFill>
@@ -3187,7 +2782,7 @@
         <a:spcBef>
           <a:spcPts val="500"/>
         </a:spcBef>
-        <a:buFont typeface="Arial" panose="020B0604020202020204" pitchFamily="34" charset="0"/>
+        <a:buFont typeface="Arial" panose="020B0604020202090204" pitchFamily="34" charset="0"/>
         <a:buChar char="•"/>
         <a:defRPr sz="1800" kern="1200">
           <a:solidFill>
@@ -3205,7 +2800,7 @@
         <a:spcBef>
           <a:spcPts val="500"/>
         </a:spcBef>
-        <a:buFont typeface="Arial" panose="020B0604020202020204" pitchFamily="34" charset="0"/>
+        <a:buFont typeface="Arial" panose="020B0604020202090204" pitchFamily="34" charset="0"/>
         <a:buChar char="•"/>
         <a:defRPr sz="1800" kern="1200">
           <a:solidFill>
@@ -3223,7 +2818,7 @@
         <a:spcBef>
           <a:spcPts val="500"/>
         </a:spcBef>
-        <a:buFont typeface="Arial" panose="020B0604020202020204" pitchFamily="34" charset="0"/>
+        <a:buFont typeface="Arial" panose="020B0604020202090204" pitchFamily="34" charset="0"/>
         <a:buChar char="•"/>
         <a:defRPr sz="1800" kern="1200">
           <a:solidFill>
@@ -3353,13 +2948,7 @@
       </p:grpSpPr>
       <p:sp>
         <p:nvSpPr>
-          <p:cNvPr id="2" name="标题 1">
-            <a:extLst>
-              <a:ext uri="{FF2B5EF4-FFF2-40B4-BE49-F238E27FC236}">
-                <a16:creationId xmlns:a16="http://schemas.microsoft.com/office/drawing/2014/main" id="{1BC220DB-65F9-634D-925A-C3B8E996C6C7}"/>
-              </a:ext>
-            </a:extLst>
-          </p:cNvPr>
+          <p:cNvPr id="2" name="标题 1"/>
           <p:cNvSpPr>
             <a:spLocks noGrp="1"/>
           </p:cNvSpPr>
@@ -3411,13 +3000,7 @@
       </p:sp>
       <p:sp>
         <p:nvSpPr>
-          <p:cNvPr id="3" name="副标题 2">
-            <a:extLst>
-              <a:ext uri="{FF2B5EF4-FFF2-40B4-BE49-F238E27FC236}">
-                <a16:creationId xmlns:a16="http://schemas.microsoft.com/office/drawing/2014/main" id="{92AB1B9A-06BA-9447-985B-09524B6469A1}"/>
-              </a:ext>
-            </a:extLst>
-          </p:cNvPr>
+          <p:cNvPr id="3" name="副标题 2"/>
           <p:cNvSpPr>
             <a:spLocks noGrp="1"/>
           </p:cNvSpPr>
@@ -3437,18 +3020,13 @@
               <a:rPr kumimoji="1" lang="zh-CN" altLang="en-US" dirty="0"/>
               <a:t>主讲教师：黄建伟</a:t>
             </a:r>
-          </a:p>
-        </p:txBody>
-      </p:sp>
-      <p:sp>
-        <p:nvSpPr>
-          <p:cNvPr id="4" name="文本框 3">
-            <a:extLst>
-              <a:ext uri="{FF2B5EF4-FFF2-40B4-BE49-F238E27FC236}">
-                <a16:creationId xmlns:a16="http://schemas.microsoft.com/office/drawing/2014/main" id="{C03EA8D1-0E76-7A43-BD09-E1A50FFCB319}"/>
-              </a:ext>
-            </a:extLst>
-          </p:cNvPr>
+            <a:endParaRPr kumimoji="1" lang="zh-CN" altLang="en-US" dirty="0"/>
+          </a:p>
+        </p:txBody>
+      </p:sp>
+      <p:sp>
+        <p:nvSpPr>
+          <p:cNvPr id="4" name="文本框 3"/>
           <p:cNvSpPr txBox="1"/>
           <p:nvPr/>
         </p:nvSpPr>
@@ -3472,15 +3050,11 @@
               <a:rPr kumimoji="1" lang="zh-CN" altLang="en-US" dirty="0"/>
               <a:t>内工大研究生专业选修课</a:t>
             </a:r>
+            <a:endParaRPr kumimoji="1" lang="zh-CN" altLang="en-US" dirty="0"/>
           </a:p>
         </p:txBody>
       </p:sp>
     </p:spTree>
-    <p:extLst>
-      <p:ext uri="{BB962C8B-B14F-4D97-AF65-F5344CB8AC3E}">
-        <p14:creationId xmlns:p14="http://schemas.microsoft.com/office/powerpoint/2010/main" val="3801196641"/>
-      </p:ext>
-    </p:extLst>
   </p:cSld>
   <p:clrMapOvr>
     <a:masterClrMapping/>
@@ -3975,6 +3549,9 @@
               </a:rPr>
               <a:t>。</a:t>
             </a:r>
+            <a:endParaRPr lang="zh-CN" altLang="en-US" sz="2200" dirty="0">
+              <a:latin typeface="Times New Roman" panose="02020503050405090304" pitchFamily="18" charset="0"/>
+            </a:endParaRPr>
           </a:p>
           <a:p>
             <a:endParaRPr kumimoji="1" lang="zh-CN" altLang="en-US" dirty="0"/>
@@ -3982,11 +3559,6 @@
         </p:txBody>
       </p:sp>
     </p:spTree>
-    <p:extLst>
-      <p:ext uri="{BB962C8B-B14F-4D97-AF65-F5344CB8AC3E}">
-        <p14:creationId xmlns:p14="http://schemas.microsoft.com/office/powerpoint/2010/main" val="256049005"/>
-      </p:ext>
-    </p:extLst>
   </p:cSld>
   <p:clrMapOvr>
     <a:masterClrMapping/>
@@ -4093,6 +3665,11 @@
               </a:rPr>
               <a:t>==</a:t>
             </a:r>
+            <a:endParaRPr kumimoji="1" lang="en-US" altLang="zh-CN" dirty="0">
+              <a:solidFill>
+                <a:srgbClr val="C00000"/>
+              </a:solidFill>
+            </a:endParaRPr>
           </a:p>
           <a:p>
             <a:pPr marL="0" indent="0">
@@ -4137,15 +3714,11 @@
               <a:rPr kumimoji="1" lang="zh-CN" altLang="en-US" dirty="0"/>
               <a:t>”</a:t>
             </a:r>
+            <a:endParaRPr kumimoji="1" lang="zh-CN" altLang="en-US" dirty="0"/>
           </a:p>
         </p:txBody>
       </p:sp>
     </p:spTree>
-    <p:extLst>
-      <p:ext uri="{BB962C8B-B14F-4D97-AF65-F5344CB8AC3E}">
-        <p14:creationId xmlns:p14="http://schemas.microsoft.com/office/powerpoint/2010/main" val="711155171"/>
-      </p:ext>
-    </p:extLst>
   </p:cSld>
   <p:clrMapOvr>
     <a:masterClrMapping/>
@@ -4189,6 +3762,7 @@
               <a:rPr kumimoji="1" lang="zh-CN" altLang="en-US" dirty="0"/>
               <a:t>循环语句</a:t>
             </a:r>
+            <a:endParaRPr kumimoji="1" lang="zh-CN" altLang="en-US" dirty="0"/>
           </a:p>
         </p:txBody>
       </p:sp>
@@ -4216,6 +3790,7 @@
               <a:rPr kumimoji="1" lang="en-US" altLang="zh-CN" dirty="0"/>
               <a:t>while</a:t>
             </a:r>
+            <a:endParaRPr kumimoji="1" lang="en-US" altLang="zh-CN" dirty="0"/>
           </a:p>
           <a:p>
             <a:pPr>
@@ -4235,6 +3810,7 @@
               <a:rPr kumimoji="1" lang="en-US" altLang="zh-CN" dirty="0"/>
               <a:t>do-While</a:t>
             </a:r>
+            <a:endParaRPr kumimoji="1" lang="en-US" altLang="zh-CN" dirty="0"/>
           </a:p>
           <a:p>
             <a:pPr>
@@ -4259,11 +3835,6 @@
         </p:txBody>
       </p:sp>
     </p:spTree>
-    <p:extLst>
-      <p:ext uri="{BB962C8B-B14F-4D97-AF65-F5344CB8AC3E}">
-        <p14:creationId xmlns:p14="http://schemas.microsoft.com/office/powerpoint/2010/main" val="3355626541"/>
-      </p:ext>
-    </p:extLst>
   </p:cSld>
   <p:clrMapOvr>
     <a:masterClrMapping/>
@@ -4307,6 +3878,7 @@
               <a:rPr kumimoji="1" lang="zh-CN" altLang="en-US" dirty="0"/>
               <a:t>关于循环语句</a:t>
             </a:r>
+            <a:endParaRPr kumimoji="1" lang="zh-CN" altLang="en-US" dirty="0"/>
           </a:p>
         </p:txBody>
       </p:sp>
@@ -4397,11 +3969,6 @@
         </p:txBody>
       </p:sp>
     </p:spTree>
-    <p:extLst>
-      <p:ext uri="{BB962C8B-B14F-4D97-AF65-F5344CB8AC3E}">
-        <p14:creationId xmlns:p14="http://schemas.microsoft.com/office/powerpoint/2010/main" val="2143481849"/>
-      </p:ext>
-    </p:extLst>
   </p:cSld>
   <p:clrMapOvr>
     <a:masterClrMapping/>
@@ -4428,13 +3995,7 @@
       </p:grpSpPr>
       <p:sp>
         <p:nvSpPr>
-          <p:cNvPr id="2" name="标题 1">
-            <a:extLst>
-              <a:ext uri="{FF2B5EF4-FFF2-40B4-BE49-F238E27FC236}">
-                <a16:creationId xmlns:a16="http://schemas.microsoft.com/office/drawing/2014/main" id="{719DF2BB-0D8C-3146-A8B0-BDD9D82A05CF}"/>
-              </a:ext>
-            </a:extLst>
-          </p:cNvPr>
+          <p:cNvPr id="2" name="标题 1"/>
           <p:cNvSpPr>
             <a:spLocks noGrp="1"/>
           </p:cNvSpPr>
@@ -4455,18 +4016,13 @@
               <a:rPr kumimoji="1" lang="zh-CN" altLang="en-US" dirty="0"/>
               <a:t>语言的数组</a:t>
             </a:r>
-          </a:p>
-        </p:txBody>
-      </p:sp>
-      <p:sp>
-        <p:nvSpPr>
-          <p:cNvPr id="3" name="内容占位符 2">
-            <a:extLst>
-              <a:ext uri="{FF2B5EF4-FFF2-40B4-BE49-F238E27FC236}">
-                <a16:creationId xmlns:a16="http://schemas.microsoft.com/office/drawing/2014/main" id="{A4D8510C-B3EF-D745-82E4-9C79F0853985}"/>
-              </a:ext>
-            </a:extLst>
-          </p:cNvPr>
+            <a:endParaRPr kumimoji="1" lang="zh-CN" altLang="en-US" dirty="0"/>
+          </a:p>
+        </p:txBody>
+      </p:sp>
+      <p:sp>
+        <p:nvSpPr>
+          <p:cNvPr id="3" name="内容占位符 2"/>
           <p:cNvSpPr>
             <a:spLocks noGrp="1"/>
           </p:cNvSpPr>
@@ -4521,6 +4077,7 @@
               <a:rPr kumimoji="1" lang="en-US" altLang="zh-CN" dirty="0"/>
               <a:t>{0,1,2,3,4}</a:t>
             </a:r>
+            <a:endParaRPr kumimoji="1" lang="en-US" altLang="zh-CN" dirty="0"/>
           </a:p>
           <a:p>
             <a:pPr marL="0" indent="0">
@@ -4540,7 +4097,7 @@
             </a:r>
             <a:r>
               <a:rPr kumimoji="1" lang="en-US" altLang="zh-CN" dirty="0">
-                <a:sym typeface="Wingdings" pitchFamily="2" charset="2"/>
+                <a:sym typeface="Wingdings" panose="05000000000000000000" pitchFamily="2" charset="2"/>
               </a:rPr>
               <a:t>&amp;(p[0])</a:t>
             </a:r>
@@ -4548,15 +4105,11 @@
               <a:rPr kumimoji="1" lang="zh-CN" altLang="en-US" dirty="0"/>
               <a:t>  </a:t>
             </a:r>
+            <a:endParaRPr kumimoji="1" lang="zh-CN" altLang="en-US" dirty="0"/>
           </a:p>
         </p:txBody>
       </p:sp>
     </p:spTree>
-    <p:extLst>
-      <p:ext uri="{BB962C8B-B14F-4D97-AF65-F5344CB8AC3E}">
-        <p14:creationId xmlns:p14="http://schemas.microsoft.com/office/powerpoint/2010/main" val="1983512805"/>
-      </p:ext>
-    </p:extLst>
   </p:cSld>
   <p:clrMapOvr>
     <a:masterClrMapping/>
@@ -4583,13 +4136,7 @@
       </p:grpSpPr>
       <p:sp>
         <p:nvSpPr>
-          <p:cNvPr id="2" name="标题 1">
-            <a:extLst>
-              <a:ext uri="{FF2B5EF4-FFF2-40B4-BE49-F238E27FC236}">
-                <a16:creationId xmlns:a16="http://schemas.microsoft.com/office/drawing/2014/main" id="{81D03E30-8DC4-4141-9A9D-03AF5CC604CA}"/>
-              </a:ext>
-            </a:extLst>
-          </p:cNvPr>
+          <p:cNvPr id="2" name="标题 1"/>
           <p:cNvSpPr>
             <a:spLocks noGrp="1"/>
           </p:cNvSpPr>
@@ -4610,18 +4157,13 @@
               <a:rPr kumimoji="1" lang="zh-CN" altLang="en-US" dirty="0"/>
               <a:t>语言中库函数</a:t>
             </a:r>
-          </a:p>
-        </p:txBody>
-      </p:sp>
-      <p:sp>
-        <p:nvSpPr>
-          <p:cNvPr id="3" name="内容占位符 2">
-            <a:extLst>
-              <a:ext uri="{FF2B5EF4-FFF2-40B4-BE49-F238E27FC236}">
-                <a16:creationId xmlns:a16="http://schemas.microsoft.com/office/drawing/2014/main" id="{3B802B99-4F5F-B340-A45E-C4A81CEFAFC2}"/>
-              </a:ext>
-            </a:extLst>
-          </p:cNvPr>
+            <a:endParaRPr kumimoji="1" lang="zh-CN" altLang="en-US" dirty="0"/>
+          </a:p>
+        </p:txBody>
+      </p:sp>
+      <p:sp>
+        <p:nvSpPr>
+          <p:cNvPr id="3" name="内容占位符 2"/>
           <p:cNvSpPr>
             <a:spLocks noGrp="1"/>
           </p:cNvSpPr>
@@ -4634,12 +4176,19 @@
           <a:bodyPr/>
           <a:lstStyle/>
           <a:p>
+            <a:pPr marL="0" indent="0">
+              <a:buNone/>
+            </a:pPr>
             <a:r>
               <a:rPr lang="zh-CN" altLang="en-US" dirty="0"/>
               <a:t>标准头文件包括：</a:t>
             </a:r>
-          </a:p>
-          <a:p>
+            <a:endParaRPr lang="zh-CN" altLang="en-US" dirty="0"/>
+          </a:p>
+          <a:p>
+            <a:pPr marL="0" indent="0">
+              <a:buNone/>
+            </a:pPr>
             <a:r>
               <a:rPr lang="en-US" altLang="zh-CN" i="1" dirty="0"/>
               <a:t>&lt;</a:t>
@@ -4679,6 +4228,9 @@
             <a:endParaRPr lang="en-US" altLang="zh-CN" dirty="0"/>
           </a:p>
           <a:p>
+            <a:pPr marL="0" indent="0">
+              <a:buNone/>
+            </a:pPr>
             <a:r>
               <a:rPr lang="en-US" altLang="zh-CN" i="1" dirty="0"/>
               <a:t>&lt;</a:t>
@@ -4718,6 +4270,9 @@
             <a:endParaRPr lang="en-US" altLang="zh-CN" dirty="0"/>
           </a:p>
           <a:p>
+            <a:pPr marL="0" indent="0">
+              <a:buNone/>
+            </a:pPr>
             <a:r>
               <a:rPr lang="en-US" altLang="zh-CN" i="1" dirty="0"/>
               <a:t>&lt;</a:t>
@@ -4757,6 +4312,9 @@
             <a:endParaRPr lang="en-US" altLang="zh-CN" dirty="0"/>
           </a:p>
           <a:p>
+            <a:pPr marL="0" indent="0">
+              <a:buNone/>
+            </a:pPr>
             <a:r>
               <a:rPr lang="en-US" altLang="zh-CN" i="1" dirty="0"/>
               <a:t>&lt;</a:t>
@@ -4796,11 +4354,6 @@
         </p:txBody>
       </p:sp>
     </p:spTree>
-    <p:extLst>
-      <p:ext uri="{BB962C8B-B14F-4D97-AF65-F5344CB8AC3E}">
-        <p14:creationId xmlns:p14="http://schemas.microsoft.com/office/powerpoint/2010/main" val="3816336157"/>
-      </p:ext>
-    </p:extLst>
   </p:cSld>
   <p:clrMapOvr>
     <a:masterClrMapping/>
@@ -4827,13 +4380,7 @@
       </p:grpSpPr>
       <p:sp>
         <p:nvSpPr>
-          <p:cNvPr id="2" name="标题 1">
-            <a:extLst>
-              <a:ext uri="{FF2B5EF4-FFF2-40B4-BE49-F238E27FC236}">
-                <a16:creationId xmlns:a16="http://schemas.microsoft.com/office/drawing/2014/main" id="{D57B368A-37D3-9844-B258-C47CAFEC6EF6}"/>
-              </a:ext>
-            </a:extLst>
-          </p:cNvPr>
+          <p:cNvPr id="2" name="标题 1"/>
           <p:cNvSpPr>
             <a:spLocks noGrp="1"/>
           </p:cNvSpPr>
@@ -4876,13 +4423,7 @@
       </p:sp>
       <p:sp>
         <p:nvSpPr>
-          <p:cNvPr id="3" name="内容占位符 2">
-            <a:extLst>
-              <a:ext uri="{FF2B5EF4-FFF2-40B4-BE49-F238E27FC236}">
-                <a16:creationId xmlns:a16="http://schemas.microsoft.com/office/drawing/2014/main" id="{398CB553-48E2-DC4C-BEA5-9B03815CFB65}"/>
-              </a:ext>
-            </a:extLst>
-          </p:cNvPr>
+          <p:cNvPr id="3" name="内容占位符 2"/>
           <p:cNvSpPr>
             <a:spLocks noGrp="1"/>
           </p:cNvSpPr>
@@ -4930,6 +4471,7 @@
               <a:rPr lang="zh-CN" altLang="en-US" sz="1600" dirty="0"/>
               <a:t>都会被自动包含进来。</a:t>
             </a:r>
+            <a:endParaRPr lang="zh-CN" altLang="en-US" sz="1600" dirty="0"/>
           </a:p>
           <a:p>
             <a:pPr marL="0" indent="0">
@@ -4939,6 +4481,7 @@
               <a:rPr lang="zh-CN" altLang="en-US" sz="1600" dirty="0"/>
               <a:t>    这个文件里定义：</a:t>
             </a:r>
+            <a:endParaRPr lang="zh-CN" altLang="en-US" sz="1600" dirty="0"/>
           </a:p>
           <a:p>
             <a:pPr marL="0" indent="0">
@@ -4968,6 +4511,7 @@
               <a:rPr lang="zh-CN" altLang="en-US" sz="1600" dirty="0"/>
               <a:t>运算符的结果类型，是某个无符号整型）；</a:t>
             </a:r>
+            <a:endParaRPr lang="zh-CN" altLang="en-US" sz="1600" dirty="0"/>
           </a:p>
           <a:p>
             <a:pPr marL="0" indent="0">
@@ -4985,6 +4529,7 @@
               <a:rPr lang="zh-CN" altLang="en-US" sz="1600" dirty="0"/>
               <a:t>（两个指针相减运算的结果类型，是某个有符号整型）；</a:t>
             </a:r>
+            <a:endParaRPr lang="zh-CN" altLang="en-US" sz="1600" dirty="0"/>
           </a:p>
           <a:p>
             <a:pPr marL="0" indent="0">
@@ -5014,6 +4559,7 @@
               <a:rPr lang="zh-CN" altLang="en-US" sz="1600" dirty="0"/>
               <a:t>）；</a:t>
             </a:r>
+            <a:endParaRPr lang="zh-CN" altLang="en-US" sz="1600" dirty="0"/>
           </a:p>
           <a:p>
             <a:pPr marL="0" indent="0">
@@ -5031,6 +4577,7 @@
               <a:rPr lang="zh-CN" altLang="en-US" sz="1600" dirty="0"/>
               <a:t>（空指针值）；</a:t>
             </a:r>
+            <a:endParaRPr lang="zh-CN" altLang="en-US" sz="1600" dirty="0"/>
           </a:p>
           <a:p>
             <a:pPr marL="0" indent="0">
@@ -5088,6 +4635,7 @@
               <a:rPr lang="zh-CN" altLang="en-US" sz="1600" dirty="0"/>
               <a:t>的变量里的偏移量）。</a:t>
             </a:r>
+            <a:endParaRPr lang="zh-CN" altLang="en-US" sz="1600" dirty="0"/>
           </a:p>
           <a:p>
             <a:pPr marL="0" indent="0">
@@ -5113,11 +4661,6 @@
         </p:txBody>
       </p:sp>
     </p:spTree>
-    <p:extLst>
-      <p:ext uri="{BB962C8B-B14F-4D97-AF65-F5344CB8AC3E}">
-        <p14:creationId xmlns:p14="http://schemas.microsoft.com/office/powerpoint/2010/main" val="769000331"/>
-      </p:ext>
-    </p:extLst>
   </p:cSld>
   <p:clrMapOvr>
     <a:masterClrMapping/>
@@ -5144,13 +4687,7 @@
       </p:grpSpPr>
       <p:sp>
         <p:nvSpPr>
-          <p:cNvPr id="2" name="标题 1">
-            <a:extLst>
-              <a:ext uri="{FF2B5EF4-FFF2-40B4-BE49-F238E27FC236}">
-                <a16:creationId xmlns:a16="http://schemas.microsoft.com/office/drawing/2014/main" id="{B5B79B20-F9FE-F54C-B7A2-3B90F61A95BC}"/>
-              </a:ext>
-            </a:extLst>
-          </p:cNvPr>
+          <p:cNvPr id="2" name="标题 1"/>
           <p:cNvSpPr>
             <a:spLocks noGrp="1"/>
           </p:cNvSpPr>
@@ -5189,13 +4726,7 @@
       </p:sp>
       <p:sp>
         <p:nvSpPr>
-          <p:cNvPr id="3" name="内容占位符 2">
-            <a:extLst>
-              <a:ext uri="{FF2B5EF4-FFF2-40B4-BE49-F238E27FC236}">
-                <a16:creationId xmlns:a16="http://schemas.microsoft.com/office/drawing/2014/main" id="{7038C311-182E-C54A-926D-896D153232FD}"/>
-              </a:ext>
-            </a:extLst>
-          </p:cNvPr>
+          <p:cNvPr id="3" name="内容占位符 2"/>
           <p:cNvSpPr>
             <a:spLocks noGrp="1"/>
           </p:cNvSpPr>
@@ -5271,6 +4802,7 @@
               <a:rPr lang="zh-CN" altLang="en-US" sz="2400" dirty="0"/>
               <a:t>。</a:t>
             </a:r>
+            <a:endParaRPr lang="zh-CN" altLang="en-US" sz="2400" dirty="0"/>
           </a:p>
           <a:p>
             <a:pPr marL="0" indent="0">
@@ -5360,11 +4892,6 @@
         </p:txBody>
       </p:sp>
     </p:spTree>
-    <p:extLst>
-      <p:ext uri="{BB962C8B-B14F-4D97-AF65-F5344CB8AC3E}">
-        <p14:creationId xmlns:p14="http://schemas.microsoft.com/office/powerpoint/2010/main" val="4047059737"/>
-      </p:ext>
-    </p:extLst>
   </p:cSld>
   <p:clrMapOvr>
     <a:masterClrMapping/>
@@ -5391,13 +4918,7 @@
       </p:grpSpPr>
       <p:sp>
         <p:nvSpPr>
-          <p:cNvPr id="2" name="标题 1">
-            <a:extLst>
-              <a:ext uri="{FF2B5EF4-FFF2-40B4-BE49-F238E27FC236}">
-                <a16:creationId xmlns:a16="http://schemas.microsoft.com/office/drawing/2014/main" id="{5D15BF3A-6FB0-3B49-A65C-EAD759CB8E1F}"/>
-              </a:ext>
-            </a:extLst>
-          </p:cNvPr>
+          <p:cNvPr id="2" name="标题 1"/>
           <p:cNvSpPr>
             <a:spLocks noGrp="1"/>
           </p:cNvSpPr>
@@ -5436,13 +4957,7 @@
       </p:sp>
       <p:sp>
         <p:nvSpPr>
-          <p:cNvPr id="3" name="内容占位符 2">
-            <a:extLst>
-              <a:ext uri="{FF2B5EF4-FFF2-40B4-BE49-F238E27FC236}">
-                <a16:creationId xmlns:a16="http://schemas.microsoft.com/office/drawing/2014/main" id="{8F01AB28-1C75-FF4C-80AD-D99F792B29D0}"/>
-              </a:ext>
-            </a:extLst>
-          </p:cNvPr>
+          <p:cNvPr id="3" name="内容占位符 2"/>
           <p:cNvSpPr>
             <a:spLocks noGrp="1"/>
           </p:cNvSpPr>
@@ -5459,15 +4974,11 @@
               <a:rPr kumimoji="1" lang="zh-CN" altLang="en-US" dirty="0"/>
               <a:t>标准输入输出（注意嵌入式中的重定向）</a:t>
             </a:r>
+            <a:endParaRPr kumimoji="1" lang="zh-CN" altLang="en-US" dirty="0"/>
           </a:p>
         </p:txBody>
       </p:sp>
     </p:spTree>
-    <p:extLst>
-      <p:ext uri="{BB962C8B-B14F-4D97-AF65-F5344CB8AC3E}">
-        <p14:creationId xmlns:p14="http://schemas.microsoft.com/office/powerpoint/2010/main" val="3642117249"/>
-      </p:ext>
-    </p:extLst>
   </p:cSld>
   <p:clrMapOvr>
     <a:masterClrMapping/>
@@ -5494,13 +5005,7 @@
       </p:grpSpPr>
       <p:sp>
         <p:nvSpPr>
-          <p:cNvPr id="2" name="标题 1">
-            <a:extLst>
-              <a:ext uri="{FF2B5EF4-FFF2-40B4-BE49-F238E27FC236}">
-                <a16:creationId xmlns:a16="http://schemas.microsoft.com/office/drawing/2014/main" id="{E6C96259-5434-864C-BAC1-A708639BB0E0}"/>
-              </a:ext>
-            </a:extLst>
-          </p:cNvPr>
+          <p:cNvPr id="2" name="标题 1"/>
           <p:cNvSpPr>
             <a:spLocks noGrp="1"/>
           </p:cNvSpPr>
@@ -5539,13 +5044,7 @@
       </p:sp>
       <p:sp>
         <p:nvSpPr>
-          <p:cNvPr id="3" name="内容占位符 2">
-            <a:extLst>
-              <a:ext uri="{FF2B5EF4-FFF2-40B4-BE49-F238E27FC236}">
-                <a16:creationId xmlns:a16="http://schemas.microsoft.com/office/drawing/2014/main" id="{5C65743E-5DA0-DC4D-8C60-6DC357511CFC}"/>
-              </a:ext>
-            </a:extLst>
-          </p:cNvPr>
+          <p:cNvPr id="3" name="内容占位符 2"/>
           <p:cNvSpPr>
             <a:spLocks noGrp="1"/>
           </p:cNvSpPr>
@@ -5565,15 +5064,11 @@
               <a:rPr kumimoji="1" lang="zh-CN" altLang="en-US" dirty="0"/>
               <a:t>数学函数</a:t>
             </a:r>
+            <a:endParaRPr kumimoji="1" lang="zh-CN" altLang="en-US" dirty="0"/>
           </a:p>
         </p:txBody>
       </p:sp>
     </p:spTree>
-    <p:extLst>
-      <p:ext uri="{BB962C8B-B14F-4D97-AF65-F5344CB8AC3E}">
-        <p14:creationId xmlns:p14="http://schemas.microsoft.com/office/powerpoint/2010/main" val="1698644272"/>
-      </p:ext>
-    </p:extLst>
   </p:cSld>
   <p:clrMapOvr>
     <a:masterClrMapping/>
@@ -5600,13 +5095,7 @@
       </p:grpSpPr>
       <p:sp>
         <p:nvSpPr>
-          <p:cNvPr id="2" name="标题 1">
-            <a:extLst>
-              <a:ext uri="{FF2B5EF4-FFF2-40B4-BE49-F238E27FC236}">
-                <a16:creationId xmlns:a16="http://schemas.microsoft.com/office/drawing/2014/main" id="{63E0C0E3-104C-3C41-BBFD-B93D86BFCC68}"/>
-              </a:ext>
-            </a:extLst>
-          </p:cNvPr>
+          <p:cNvPr id="2" name="标题 1"/>
           <p:cNvSpPr>
             <a:spLocks noGrp="1"/>
           </p:cNvSpPr>
@@ -5631,18 +5120,13 @@
               <a:rPr kumimoji="1" lang="zh-CN" altLang="en-US" dirty="0"/>
               <a:t>语言知识回顾</a:t>
             </a:r>
-          </a:p>
-        </p:txBody>
-      </p:sp>
-      <p:sp>
-        <p:nvSpPr>
-          <p:cNvPr id="3" name="内容占位符 2">
-            <a:extLst>
-              <a:ext uri="{FF2B5EF4-FFF2-40B4-BE49-F238E27FC236}">
-                <a16:creationId xmlns:a16="http://schemas.microsoft.com/office/drawing/2014/main" id="{530B46E8-29AC-3445-8B0A-A076FA33F804}"/>
-              </a:ext>
-            </a:extLst>
-          </p:cNvPr>
+            <a:endParaRPr kumimoji="1" lang="zh-CN" altLang="en-US" dirty="0"/>
+          </a:p>
+        </p:txBody>
+      </p:sp>
+      <p:sp>
+        <p:nvSpPr>
+          <p:cNvPr id="3" name="内容占位符 2"/>
           <p:cNvSpPr>
             <a:spLocks noGrp="1"/>
           </p:cNvSpPr>
@@ -5658,7 +5142,7 @@
           <a:lstStyle/>
           <a:p>
             <a:pPr>
-              <a:buFont typeface="Wingdings" pitchFamily="2" charset="2"/>
+              <a:buFont typeface="Wingdings" panose="05000000000000000000" pitchFamily="2" charset="2"/>
               <a:buChar char="Ø"/>
             </a:pPr>
             <a:r>
@@ -5689,7 +5173,7 @@
           </a:p>
           <a:p>
             <a:pPr>
-              <a:buFont typeface="Wingdings" pitchFamily="2" charset="2"/>
+              <a:buFont typeface="Wingdings" panose="05000000000000000000" pitchFamily="2" charset="2"/>
               <a:buChar char="Ø"/>
             </a:pPr>
             <a:r>
@@ -5720,7 +5204,7 @@
           </a:p>
           <a:p>
             <a:pPr>
-              <a:buFont typeface="Wingdings" pitchFamily="2" charset="2"/>
+              <a:buFont typeface="Wingdings" panose="05000000000000000000" pitchFamily="2" charset="2"/>
               <a:buChar char="Ø"/>
             </a:pPr>
             <a:r>
@@ -5739,7 +5223,7 @@
           </a:p>
           <a:p>
             <a:pPr>
-              <a:buFont typeface="Wingdings" pitchFamily="2" charset="2"/>
+              <a:buFont typeface="Wingdings" panose="05000000000000000000" pitchFamily="2" charset="2"/>
               <a:buChar char="Ø"/>
             </a:pPr>
             <a:r>
@@ -5758,7 +5242,7 @@
           </a:p>
           <a:p>
             <a:pPr>
-              <a:buFont typeface="Wingdings" pitchFamily="2" charset="2"/>
+              <a:buFont typeface="Wingdings" panose="05000000000000000000" pitchFamily="2" charset="2"/>
               <a:buChar char="Ø"/>
             </a:pPr>
             <a:r>
@@ -5777,7 +5261,7 @@
           </a:p>
           <a:p>
             <a:pPr>
-              <a:buFont typeface="Wingdings" pitchFamily="2" charset="2"/>
+              <a:buFont typeface="Wingdings" panose="05000000000000000000" pitchFamily="2" charset="2"/>
               <a:buChar char="Ø"/>
             </a:pPr>
             <a:r>
@@ -5796,7 +5280,7 @@
           </a:p>
           <a:p>
             <a:pPr>
-              <a:buFont typeface="Wingdings" pitchFamily="2" charset="2"/>
+              <a:buFont typeface="Wingdings" panose="05000000000000000000" pitchFamily="2" charset="2"/>
               <a:buChar char="Ø"/>
             </a:pPr>
             <a:r>
@@ -5815,7 +5299,7 @@
           </a:p>
           <a:p>
             <a:pPr>
-              <a:buFont typeface="Wingdings" pitchFamily="2" charset="2"/>
+              <a:buFont typeface="Wingdings" panose="05000000000000000000" pitchFamily="2" charset="2"/>
               <a:buChar char="Ø"/>
             </a:pPr>
             <a:r>
@@ -5830,18 +5314,14 @@
               <a:rPr kumimoji="1" lang="zh-CN" altLang="en-US" dirty="0"/>
               <a:t>编译介绍</a:t>
             </a:r>
-          </a:p>
-          <a:p>
             <a:endParaRPr kumimoji="1" lang="zh-CN" altLang="en-US" dirty="0"/>
           </a:p>
+          <a:p>
+            <a:endParaRPr kumimoji="1" lang="zh-CN" altLang="en-US" dirty="0"/>
+          </a:p>
         </p:txBody>
       </p:sp>
     </p:spTree>
-    <p:extLst>
-      <p:ext uri="{BB962C8B-B14F-4D97-AF65-F5344CB8AC3E}">
-        <p14:creationId xmlns:p14="http://schemas.microsoft.com/office/powerpoint/2010/main" val="2867538787"/>
-      </p:ext>
-    </p:extLst>
   </p:cSld>
   <p:clrMapOvr>
     <a:masterClrMapping/>
@@ -5868,13 +5348,7 @@
       </p:grpSpPr>
       <p:sp>
         <p:nvSpPr>
-          <p:cNvPr id="2" name="标题 1">
-            <a:extLst>
-              <a:ext uri="{FF2B5EF4-FFF2-40B4-BE49-F238E27FC236}">
-                <a16:creationId xmlns:a16="http://schemas.microsoft.com/office/drawing/2014/main" id="{7A00F310-2C01-4747-A1BE-FB5EF746146C}"/>
-              </a:ext>
-            </a:extLst>
-          </p:cNvPr>
+          <p:cNvPr id="2" name="标题 1"/>
           <p:cNvSpPr>
             <a:spLocks noGrp="1"/>
           </p:cNvSpPr>
@@ -5913,13 +5387,7 @@
       </p:sp>
       <p:pic>
         <p:nvPicPr>
-          <p:cNvPr id="4" name="内容占位符 3">
-            <a:extLst>
-              <a:ext uri="{FF2B5EF4-FFF2-40B4-BE49-F238E27FC236}">
-                <a16:creationId xmlns:a16="http://schemas.microsoft.com/office/drawing/2014/main" id="{84173B78-5BAD-CB4B-BC32-BC9683EDAF3F}"/>
-              </a:ext>
-            </a:extLst>
-          </p:cNvPr>
+          <p:cNvPr id="4" name="内容占位符 3"/>
           <p:cNvPicPr>
             <a:picLocks noGrp="1" noChangeAspect="1"/>
           </p:cNvPicPr>
@@ -5928,7 +5396,7 @@
           </p:nvPr>
         </p:nvPicPr>
         <p:blipFill>
-          <a:blip r:embed="rId2"/>
+          <a:blip r:embed="rId1"/>
           <a:stretch>
             <a:fillRect/>
           </a:stretch>
@@ -5944,11 +5412,6 @@
         </p:spPr>
       </p:pic>
     </p:spTree>
-    <p:extLst>
-      <p:ext uri="{BB962C8B-B14F-4D97-AF65-F5344CB8AC3E}">
-        <p14:creationId xmlns:p14="http://schemas.microsoft.com/office/powerpoint/2010/main" val="1937780053"/>
-      </p:ext>
-    </p:extLst>
   </p:cSld>
   <p:clrMapOvr>
     <a:masterClrMapping/>
@@ -5983,13 +5446,7 @@
       </p:grpSpPr>
       <p:sp>
         <p:nvSpPr>
-          <p:cNvPr id="2" name="标题 1">
-            <a:extLst>
-              <a:ext uri="{FF2B5EF4-FFF2-40B4-BE49-F238E27FC236}">
-                <a16:creationId xmlns:a16="http://schemas.microsoft.com/office/drawing/2014/main" id="{BF5909DA-9BED-0F43-9892-427C9165B8DF}"/>
-              </a:ext>
-            </a:extLst>
-          </p:cNvPr>
+          <p:cNvPr id="2" name="标题 1"/>
           <p:cNvSpPr>
             <a:spLocks noGrp="1"/>
           </p:cNvSpPr>
@@ -6036,13 +5493,7 @@
       </p:sp>
       <p:pic>
         <p:nvPicPr>
-          <p:cNvPr id="4" name="内容占位符 3">
-            <a:extLst>
-              <a:ext uri="{FF2B5EF4-FFF2-40B4-BE49-F238E27FC236}">
-                <a16:creationId xmlns:a16="http://schemas.microsoft.com/office/drawing/2014/main" id="{D625C904-E23A-8D42-A157-3E61B65BA584}"/>
-              </a:ext>
-            </a:extLst>
-          </p:cNvPr>
+          <p:cNvPr id="4" name="内容占位符 3"/>
           <p:cNvPicPr>
             <a:picLocks noGrp="1" noChangeAspect="1"/>
           </p:cNvPicPr>
@@ -6051,9 +5502,11 @@
           </p:nvPr>
         </p:nvPicPr>
         <p:blipFill rotWithShape="1">
-          <a:blip r:embed="rId2"/>
+          <a:blip r:embed="rId1"/>
           <a:srcRect t="5679" r="2" b="2"/>
-          <a:stretch/>
+          <a:stretch>
+            <a:fillRect/>
+          </a:stretch>
         </p:blipFill>
         <p:spPr>
           <a:xfrm>
@@ -6066,11 +5519,6 @@
         </p:spPr>
       </p:pic>
     </p:spTree>
-    <p:extLst>
-      <p:ext uri="{BB962C8B-B14F-4D97-AF65-F5344CB8AC3E}">
-        <p14:creationId xmlns:p14="http://schemas.microsoft.com/office/powerpoint/2010/main" val="375566583"/>
-      </p:ext>
-    </p:extLst>
   </p:cSld>
   <p:clrMapOvr>
     <a:masterClrMapping/>
@@ -6097,13 +5545,7 @@
       </p:grpSpPr>
       <p:sp>
         <p:nvSpPr>
-          <p:cNvPr id="2" name="标题 1">
-            <a:extLst>
-              <a:ext uri="{FF2B5EF4-FFF2-40B4-BE49-F238E27FC236}">
-                <a16:creationId xmlns:a16="http://schemas.microsoft.com/office/drawing/2014/main" id="{328BDFB6-2AAC-C448-8682-C18A196A3B26}"/>
-              </a:ext>
-            </a:extLst>
-          </p:cNvPr>
+          <p:cNvPr id="2" name="标题 1"/>
           <p:cNvSpPr>
             <a:spLocks noGrp="1"/>
           </p:cNvSpPr>
@@ -6142,13 +5584,7 @@
       </p:sp>
       <p:sp>
         <p:nvSpPr>
-          <p:cNvPr id="3" name="内容占位符 2">
-            <a:extLst>
-              <a:ext uri="{FF2B5EF4-FFF2-40B4-BE49-F238E27FC236}">
-                <a16:creationId xmlns:a16="http://schemas.microsoft.com/office/drawing/2014/main" id="{70F9C87B-6F0A-BA4A-B3B7-EA2DA064DDD1}"/>
-              </a:ext>
-            </a:extLst>
-          </p:cNvPr>
+          <p:cNvPr id="3" name="内容占位符 2"/>
           <p:cNvSpPr>
             <a:spLocks noGrp="1"/>
           </p:cNvSpPr>
@@ -6299,11 +5735,6 @@
         </p:txBody>
       </p:sp>
     </p:spTree>
-    <p:extLst>
-      <p:ext uri="{BB962C8B-B14F-4D97-AF65-F5344CB8AC3E}">
-        <p14:creationId xmlns:p14="http://schemas.microsoft.com/office/powerpoint/2010/main" val="4169386126"/>
-      </p:ext>
-    </p:extLst>
   </p:cSld>
   <p:clrMapOvr>
     <a:masterClrMapping/>
@@ -6330,13 +5761,7 @@
       </p:grpSpPr>
       <p:sp>
         <p:nvSpPr>
-          <p:cNvPr id="2" name="标题 1">
-            <a:extLst>
-              <a:ext uri="{FF2B5EF4-FFF2-40B4-BE49-F238E27FC236}">
-                <a16:creationId xmlns:a16="http://schemas.microsoft.com/office/drawing/2014/main" id="{4E1D5D1A-21FA-9D42-86CB-5B1538350826}"/>
-              </a:ext>
-            </a:extLst>
-          </p:cNvPr>
+          <p:cNvPr id="2" name="标题 1"/>
           <p:cNvSpPr>
             <a:spLocks noGrp="1"/>
           </p:cNvSpPr>
@@ -6375,13 +5800,7 @@
       </p:sp>
       <p:pic>
         <p:nvPicPr>
-          <p:cNvPr id="4" name="内容占位符 3">
-            <a:extLst>
-              <a:ext uri="{FF2B5EF4-FFF2-40B4-BE49-F238E27FC236}">
-                <a16:creationId xmlns:a16="http://schemas.microsoft.com/office/drawing/2014/main" id="{E301BE16-00AF-974E-A54A-FB4AF7B52D22}"/>
-              </a:ext>
-            </a:extLst>
-          </p:cNvPr>
+          <p:cNvPr id="4" name="内容占位符 3"/>
           <p:cNvPicPr>
             <a:picLocks noGrp="1" noChangeAspect="1"/>
           </p:cNvPicPr>
@@ -6390,7 +5809,7 @@
           </p:nvPr>
         </p:nvPicPr>
         <p:blipFill>
-          <a:blip r:embed="rId2"/>
+          <a:blip r:embed="rId1"/>
           <a:stretch>
             <a:fillRect/>
           </a:stretch>
@@ -6406,11 +5825,6 @@
         </p:spPr>
       </p:pic>
     </p:spTree>
-    <p:extLst>
-      <p:ext uri="{BB962C8B-B14F-4D97-AF65-F5344CB8AC3E}">
-        <p14:creationId xmlns:p14="http://schemas.microsoft.com/office/powerpoint/2010/main" val="1153979324"/>
-      </p:ext>
-    </p:extLst>
   </p:cSld>
   <p:clrMapOvr>
     <a:masterClrMapping/>
@@ -6437,13 +5851,7 @@
       </p:grpSpPr>
       <p:sp>
         <p:nvSpPr>
-          <p:cNvPr id="2" name="标题 1">
-            <a:extLst>
-              <a:ext uri="{FF2B5EF4-FFF2-40B4-BE49-F238E27FC236}">
-                <a16:creationId xmlns:a16="http://schemas.microsoft.com/office/drawing/2014/main" id="{055169C7-E8BB-2341-94F1-605F2A02A415}"/>
-              </a:ext>
-            </a:extLst>
-          </p:cNvPr>
+          <p:cNvPr id="2" name="标题 1"/>
           <p:cNvSpPr>
             <a:spLocks noGrp="1"/>
           </p:cNvSpPr>
@@ -6482,13 +5890,7 @@
       </p:sp>
       <p:sp>
         <p:nvSpPr>
-          <p:cNvPr id="3" name="内容占位符 2">
-            <a:extLst>
-              <a:ext uri="{FF2B5EF4-FFF2-40B4-BE49-F238E27FC236}">
-                <a16:creationId xmlns:a16="http://schemas.microsoft.com/office/drawing/2014/main" id="{941F2A03-7FAD-A740-8694-9276AA4EFA5B}"/>
-              </a:ext>
-            </a:extLst>
-          </p:cNvPr>
+          <p:cNvPr id="3" name="内容占位符 2"/>
           <p:cNvSpPr>
             <a:spLocks noGrp="1"/>
           </p:cNvSpPr>
@@ -6522,20 +5924,14 @@
       </p:sp>
       <p:pic>
         <p:nvPicPr>
-          <p:cNvPr id="4" name="图片 3">
-            <a:extLst>
-              <a:ext uri="{FF2B5EF4-FFF2-40B4-BE49-F238E27FC236}">
-                <a16:creationId xmlns:a16="http://schemas.microsoft.com/office/drawing/2014/main" id="{E7B734C0-1909-3B41-BDE9-72D26602DE65}"/>
-              </a:ext>
-            </a:extLst>
-          </p:cNvPr>
+          <p:cNvPr id="4" name="图片 3"/>
           <p:cNvPicPr>
             <a:picLocks noChangeAspect="1"/>
           </p:cNvPicPr>
           <p:nvPr/>
         </p:nvPicPr>
         <p:blipFill>
-          <a:blip r:embed="rId2"/>
+          <a:blip r:embed="rId1"/>
           <a:stretch>
             <a:fillRect/>
           </a:stretch>
@@ -6551,11 +5947,6 @@
         </p:spPr>
       </p:pic>
     </p:spTree>
-    <p:extLst>
-      <p:ext uri="{BB962C8B-B14F-4D97-AF65-F5344CB8AC3E}">
-        <p14:creationId xmlns:p14="http://schemas.microsoft.com/office/powerpoint/2010/main" val="282731550"/>
-      </p:ext>
-    </p:extLst>
   </p:cSld>
   <p:clrMapOvr>
     <a:masterClrMapping/>
@@ -6582,13 +5973,7 @@
       </p:grpSpPr>
       <p:sp>
         <p:nvSpPr>
-          <p:cNvPr id="2" name="标题 1">
-            <a:extLst>
-              <a:ext uri="{FF2B5EF4-FFF2-40B4-BE49-F238E27FC236}">
-                <a16:creationId xmlns:a16="http://schemas.microsoft.com/office/drawing/2014/main" id="{A1E6D761-8E3A-2E48-B930-EEB633E6544D}"/>
-              </a:ext>
-            </a:extLst>
-          </p:cNvPr>
+          <p:cNvPr id="2" name="标题 1"/>
           <p:cNvSpPr>
             <a:spLocks noGrp="1"/>
           </p:cNvSpPr>
@@ -6627,13 +6012,7 @@
       </p:sp>
       <p:sp>
         <p:nvSpPr>
-          <p:cNvPr id="3" name="内容占位符 2">
-            <a:extLst>
-              <a:ext uri="{FF2B5EF4-FFF2-40B4-BE49-F238E27FC236}">
-                <a16:creationId xmlns:a16="http://schemas.microsoft.com/office/drawing/2014/main" id="{3EA4F451-1CF6-CE40-9B34-4AF90DD38F60}"/>
-              </a:ext>
-            </a:extLst>
-          </p:cNvPr>
+          <p:cNvPr id="3" name="内容占位符 2"/>
           <p:cNvSpPr>
             <a:spLocks noGrp="1"/>
           </p:cNvSpPr>
@@ -6659,20 +6038,14 @@
       </p:sp>
       <p:pic>
         <p:nvPicPr>
-          <p:cNvPr id="4" name="图片 3">
-            <a:extLst>
-              <a:ext uri="{FF2B5EF4-FFF2-40B4-BE49-F238E27FC236}">
-                <a16:creationId xmlns:a16="http://schemas.microsoft.com/office/drawing/2014/main" id="{9E4B60AC-285F-C74C-89FB-0B214FB23514}"/>
-              </a:ext>
-            </a:extLst>
-          </p:cNvPr>
+          <p:cNvPr id="4" name="图片 3"/>
           <p:cNvPicPr>
             <a:picLocks noChangeAspect="1"/>
           </p:cNvPicPr>
           <p:nvPr/>
         </p:nvPicPr>
         <p:blipFill>
-          <a:blip r:embed="rId2"/>
+          <a:blip r:embed="rId1"/>
           <a:stretch>
             <a:fillRect/>
           </a:stretch>
@@ -6688,11 +6061,6 @@
         </p:spPr>
       </p:pic>
     </p:spTree>
-    <p:extLst>
-      <p:ext uri="{BB962C8B-B14F-4D97-AF65-F5344CB8AC3E}">
-        <p14:creationId xmlns:p14="http://schemas.microsoft.com/office/powerpoint/2010/main" val="119606843"/>
-      </p:ext>
-    </p:extLst>
   </p:cSld>
   <p:clrMapOvr>
     <a:masterClrMapping/>
@@ -6719,13 +6087,7 @@
       </p:grpSpPr>
       <p:sp>
         <p:nvSpPr>
-          <p:cNvPr id="2" name="标题 1">
-            <a:extLst>
-              <a:ext uri="{FF2B5EF4-FFF2-40B4-BE49-F238E27FC236}">
-                <a16:creationId xmlns:a16="http://schemas.microsoft.com/office/drawing/2014/main" id="{C40A8117-D1F6-6C4A-A622-D6B1001A20DF}"/>
-              </a:ext>
-            </a:extLst>
-          </p:cNvPr>
+          <p:cNvPr id="2" name="标题 1"/>
           <p:cNvSpPr>
             <a:spLocks noGrp="1"/>
           </p:cNvSpPr>
@@ -6756,13 +6118,7 @@
       </p:sp>
       <p:sp>
         <p:nvSpPr>
-          <p:cNvPr id="3" name="内容占位符 2">
-            <a:extLst>
-              <a:ext uri="{FF2B5EF4-FFF2-40B4-BE49-F238E27FC236}">
-                <a16:creationId xmlns:a16="http://schemas.microsoft.com/office/drawing/2014/main" id="{0EC6256C-BBCF-334F-A009-1E2C3AD7B2BF}"/>
-              </a:ext>
-            </a:extLst>
-          </p:cNvPr>
+          <p:cNvPr id="3" name="内容占位符 2"/>
           <p:cNvSpPr>
             <a:spLocks noGrp="1"/>
           </p:cNvSpPr>
@@ -6784,6 +6140,7 @@
               <a:rPr lang="zh-CN" altLang="en-US" dirty="0"/>
               <a:t>就一个函数！</a:t>
             </a:r>
+            <a:endParaRPr lang="zh-CN" altLang="en-US" dirty="0"/>
           </a:p>
           <a:p>
             <a:pPr marL="0" indent="0">
@@ -6797,6 +6154,11 @@
               </a:rPr>
               <a:t>void assert(int expression)</a:t>
             </a:r>
+            <a:endParaRPr lang="en-US" altLang="zh-CN" u="sng" dirty="0">
+              <a:solidFill>
+                <a:srgbClr val="C00000"/>
+              </a:solidFill>
+            </a:endParaRPr>
           </a:p>
           <a:p>
             <a:pPr marL="0" indent="0">
@@ -6934,11 +6296,6 @@
         </p:txBody>
       </p:sp>
     </p:spTree>
-    <p:extLst>
-      <p:ext uri="{BB962C8B-B14F-4D97-AF65-F5344CB8AC3E}">
-        <p14:creationId xmlns:p14="http://schemas.microsoft.com/office/powerpoint/2010/main" val="2456106137"/>
-      </p:ext>
-    </p:extLst>
   </p:cSld>
   <p:clrMapOvr>
     <a:masterClrMapping/>
@@ -6965,13 +6322,7 @@
       </p:grpSpPr>
       <p:sp>
         <p:nvSpPr>
-          <p:cNvPr id="2" name="标题 1">
-            <a:extLst>
-              <a:ext uri="{FF2B5EF4-FFF2-40B4-BE49-F238E27FC236}">
-                <a16:creationId xmlns:a16="http://schemas.microsoft.com/office/drawing/2014/main" id="{B0F5F8E1-B45A-7A4B-822F-9AFD7A1321B2}"/>
-              </a:ext>
-            </a:extLst>
-          </p:cNvPr>
+          <p:cNvPr id="2" name="标题 1"/>
           <p:cNvSpPr>
             <a:spLocks noGrp="1"/>
           </p:cNvSpPr>
@@ -6992,18 +6343,13 @@
               <a:rPr kumimoji="1" lang="zh-CN" altLang="en-US" dirty="0"/>
               <a:t>语言数据类型</a:t>
             </a:r>
-          </a:p>
-        </p:txBody>
-      </p:sp>
-      <p:sp>
-        <p:nvSpPr>
-          <p:cNvPr id="3" name="内容占位符 2">
-            <a:extLst>
-              <a:ext uri="{FF2B5EF4-FFF2-40B4-BE49-F238E27FC236}">
-                <a16:creationId xmlns:a16="http://schemas.microsoft.com/office/drawing/2014/main" id="{6633FA2E-4931-3B4A-BCE8-2EE3DF3C1512}"/>
-              </a:ext>
-            </a:extLst>
-          </p:cNvPr>
+            <a:endParaRPr kumimoji="1" lang="zh-CN" altLang="en-US" dirty="0"/>
+          </a:p>
+        </p:txBody>
+      </p:sp>
+      <p:sp>
+        <p:nvSpPr>
+          <p:cNvPr id="3" name="内容占位符 2"/>
           <p:cNvSpPr>
             <a:spLocks noGrp="1"/>
           </p:cNvSpPr>
@@ -7054,48 +6400,48 @@
             </a:r>
             <a:r>
               <a:rPr lang="pt-BR" altLang="zh-CN" dirty="0" err="1">
-                <a:latin typeface="Courier New" panose="02070309020205020404" pitchFamily="49" charset="0"/>
+                <a:latin typeface="Courier New" panose="02070409020205090404" pitchFamily="49" charset="0"/>
               </a:rPr>
               <a:t>unsigned</a:t>
             </a:r>
             <a:r>
               <a:rPr lang="pt-BR" altLang="zh-CN" dirty="0">
-                <a:latin typeface="Courier New" panose="02070309020205020404" pitchFamily="49" charset="0"/>
+                <a:latin typeface="Courier New" panose="02070409020205090404" pitchFamily="49" charset="0"/>
               </a:rPr>
               <a:t> </a:t>
             </a:r>
             <a:r>
               <a:rPr lang="pt-BR" altLang="zh-CN" dirty="0" err="1">
-                <a:latin typeface="Courier New" panose="02070309020205020404" pitchFamily="49" charset="0"/>
+                <a:latin typeface="Courier New" panose="02070409020205090404" pitchFamily="49" charset="0"/>
               </a:rPr>
               <a:t>int</a:t>
             </a:r>
             <a:r>
               <a:rPr lang="pt-BR" altLang="zh-CN" dirty="0">
-                <a:latin typeface="Courier New" panose="02070309020205020404" pitchFamily="49" charset="0"/>
+                <a:latin typeface="Courier New" panose="02070409020205090404" pitchFamily="49" charset="0"/>
               </a:rPr>
               <a:t> </a:t>
             </a:r>
             <a:r>
               <a:rPr lang="en-US" altLang="zh-CN" dirty="0" err="1">
-                <a:latin typeface="Courier New" panose="02070309020205020404" pitchFamily="49" charset="0"/>
+                <a:latin typeface="Courier New" panose="02070409020205090404" pitchFamily="49" charset="0"/>
               </a:rPr>
               <a:t>uint</a:t>
             </a:r>
             <a:r>
               <a:rPr lang="pt-BR" altLang="zh-CN" dirty="0">
-                <a:latin typeface="Courier New" panose="02070309020205020404" pitchFamily="49" charset="0"/>
+                <a:latin typeface="Courier New" panose="02070409020205090404" pitchFamily="49" charset="0"/>
               </a:rPr>
               <a:t>32</a:t>
             </a:r>
             <a:r>
               <a:rPr lang="en-US" altLang="zh-CN" dirty="0">
-                <a:latin typeface="Courier New" panose="02070309020205020404" pitchFamily="49" charset="0"/>
+                <a:latin typeface="Courier New" panose="02070409020205090404" pitchFamily="49" charset="0"/>
               </a:rPr>
               <a:t>_t;</a:t>
             </a:r>
             <a:endParaRPr lang="pt-BR" altLang="zh-CN" dirty="0">
-              <a:latin typeface="Courier New" panose="02070309020205020404" pitchFamily="49" charset="0"/>
+              <a:latin typeface="Courier New" panose="02070409020205090404" pitchFamily="49" charset="0"/>
             </a:endParaRPr>
           </a:p>
           <a:p>
@@ -7103,10 +6449,54 @@
               <a:buNone/>
             </a:pPr>
             <a:r>
-              <a:rPr kumimoji="1" lang="zh-CN" altLang="en-US" dirty="0">
-                <a:latin typeface="Courier New" panose="02070309020205020404" pitchFamily="49" charset="0"/>
-              </a:rPr>
+              <a:rPr kumimoji="1" lang="en-US" altLang="zh-CN" dirty="0"/>
+              <a:t>  typedef</a:t>
+            </a:r>
+            <a:r>
+              <a:rPr kumimoji="1" lang="zh-CN" altLang="en-US" dirty="0"/>
               <a:t> </a:t>
+            </a:r>
+            <a:r>
+              <a:rPr lang="pt-BR" altLang="zh-CN" dirty="0" err="1">
+                <a:latin typeface="Courier New" panose="02070409020205090404" pitchFamily="49" charset="0"/>
+              </a:rPr>
+              <a:t>unsigned</a:t>
+            </a:r>
+            <a:r>
+              <a:rPr lang="pt-BR" altLang="zh-CN" dirty="0">
+                <a:latin typeface="Courier New" panose="02070409020205090404" pitchFamily="49" charset="0"/>
+              </a:rPr>
+              <a:t> </a:t>
+            </a:r>
+            <a:r>
+              <a:rPr lang="en-US" altLang="zh-CN" dirty="0">
+                <a:latin typeface="Courier New" panose="02070409020205090404" pitchFamily="49" charset="0"/>
+              </a:rPr>
+              <a:t>short</a:t>
+            </a:r>
+            <a:r>
+              <a:rPr lang="pt-BR" altLang="zh-CN" dirty="0">
+                <a:latin typeface="Courier New" panose="02070409020205090404" pitchFamily="49" charset="0"/>
+              </a:rPr>
+              <a:t> </a:t>
+            </a:r>
+            <a:r>
+              <a:rPr lang="en-US" altLang="zh-CN" dirty="0">
+                <a:latin typeface="Courier New" panose="02070409020205090404" pitchFamily="49" charset="0"/>
+              </a:rPr>
+              <a:t>uint16_t;</a:t>
+            </a:r>
+            <a:endParaRPr lang="en-US" altLang="zh-CN" dirty="0">
+              <a:latin typeface="Courier New" panose="02070409020205090404" pitchFamily="49" charset="0"/>
+            </a:endParaRPr>
+          </a:p>
+          <a:p>
+            <a:pPr marL="0" indent="0">
+              <a:buNone/>
+            </a:pPr>
+            <a:r>
+              <a:rPr kumimoji="1" lang="zh-CN" altLang="en-US" dirty="0"/>
+              <a:t>  </a:t>
             </a:r>
             <a:r>
               <a:rPr kumimoji="1" lang="en-US" altLang="zh-CN" dirty="0"/>
@@ -7118,34 +6508,45 @@
             </a:r>
             <a:r>
               <a:rPr lang="pt-BR" altLang="zh-CN" dirty="0" err="1">
-                <a:latin typeface="Courier New" panose="02070309020205020404" pitchFamily="49" charset="0"/>
+                <a:latin typeface="Courier New" panose="02070409020205090404" pitchFamily="49" charset="0"/>
               </a:rPr>
               <a:t>unsigned</a:t>
             </a:r>
             <a:r>
               <a:rPr lang="pt-BR" altLang="zh-CN" dirty="0">
-                <a:latin typeface="Courier New" panose="02070309020205020404" pitchFamily="49" charset="0"/>
+                <a:latin typeface="Courier New" panose="02070409020205090404" pitchFamily="49" charset="0"/>
               </a:rPr>
               <a:t> </a:t>
             </a:r>
             <a:r>
               <a:rPr lang="en-US" altLang="zh-CN" dirty="0">
-                <a:latin typeface="Courier New" panose="02070309020205020404" pitchFamily="49" charset="0"/>
-              </a:rPr>
-              <a:t>short</a:t>
+                <a:latin typeface="Courier New" panose="02070409020205090404" pitchFamily="49" charset="0"/>
+              </a:rPr>
+              <a:t>char</a:t>
             </a:r>
             <a:r>
               <a:rPr lang="pt-BR" altLang="zh-CN" dirty="0">
-                <a:latin typeface="Courier New" panose="02070309020205020404" pitchFamily="49" charset="0"/>
+                <a:latin typeface="Courier New" panose="02070409020205090404" pitchFamily="49" charset="0"/>
               </a:rPr>
               <a:t> </a:t>
             </a:r>
             <a:r>
               <a:rPr lang="en-US" altLang="zh-CN" dirty="0">
-                <a:latin typeface="Courier New" panose="02070309020205020404" pitchFamily="49" charset="0"/>
-              </a:rPr>
-              <a:t>uint16_t;</a:t>
-            </a:r>
+                <a:latin typeface="Courier New" panose="02070409020205090404" pitchFamily="49" charset="0"/>
+              </a:rPr>
+              <a:t>uint8_t;</a:t>
+            </a:r>
+            <a:endParaRPr lang="en-US" altLang="zh-CN" dirty="0">
+              <a:latin typeface="Courier New" panose="02070409020205090404" pitchFamily="49" charset="0"/>
+            </a:endParaRPr>
+          </a:p>
+          <a:p>
+            <a:pPr marL="0" indent="0">
+              <a:buNone/>
+            </a:pPr>
+            <a:endParaRPr kumimoji="1" lang="en-US" altLang="zh-CN" dirty="0">
+              <a:latin typeface="Courier New" panose="02070409020205090404" pitchFamily="49" charset="0"/>
+            </a:endParaRPr>
           </a:p>
           <a:p>
             <a:pPr marL="0" indent="0">
@@ -7164,42 +6565,83 @@
               <a:t> </a:t>
             </a:r>
             <a:r>
+              <a:rPr lang="zh-CN" altLang="en-US" dirty="0">
+                <a:latin typeface="Courier New" panose="02070409020205090404" pitchFamily="49" charset="0"/>
+              </a:rPr>
+              <a:t> </a:t>
+            </a:r>
+            <a:r>
               <a:rPr lang="pt-BR" altLang="zh-CN" dirty="0" err="1">
-                <a:latin typeface="Courier New" panose="02070309020205020404" pitchFamily="49" charset="0"/>
-              </a:rPr>
-              <a:t>unsigned</a:t>
+                <a:latin typeface="Courier New" panose="02070409020205090404" pitchFamily="49" charset="0"/>
+              </a:rPr>
+              <a:t>int</a:t>
             </a:r>
             <a:r>
               <a:rPr lang="pt-BR" altLang="zh-CN" dirty="0">
-                <a:latin typeface="Courier New" panose="02070309020205020404" pitchFamily="49" charset="0"/>
+                <a:latin typeface="Courier New" panose="02070409020205090404" pitchFamily="49" charset="0"/>
               </a:rPr>
               <a:t> </a:t>
             </a:r>
             <a:r>
               <a:rPr lang="en-US" altLang="zh-CN" dirty="0">
-                <a:latin typeface="Courier New" panose="02070309020205020404" pitchFamily="49" charset="0"/>
-              </a:rPr>
-              <a:t>char</a:t>
+                <a:latin typeface="Courier New" panose="02070409020205090404" pitchFamily="49" charset="0"/>
+              </a:rPr>
+              <a:t>int</a:t>
             </a:r>
             <a:r>
               <a:rPr lang="pt-BR" altLang="zh-CN" dirty="0">
-                <a:latin typeface="Courier New" panose="02070309020205020404" pitchFamily="49" charset="0"/>
-              </a:rPr>
+                <a:latin typeface="Courier New" panose="02070409020205090404" pitchFamily="49" charset="0"/>
+              </a:rPr>
+              <a:t>32</a:t>
+            </a:r>
+            <a:r>
+              <a:rPr lang="en-US" altLang="zh-CN" dirty="0">
+                <a:latin typeface="Courier New" panose="02070409020205090404" pitchFamily="49" charset="0"/>
+              </a:rPr>
+              <a:t>_t;</a:t>
+            </a:r>
+            <a:endParaRPr lang="pt-BR" altLang="zh-CN" dirty="0">
+              <a:latin typeface="Courier New" panose="02070409020205090404" pitchFamily="49" charset="0"/>
+            </a:endParaRPr>
+          </a:p>
+          <a:p>
+            <a:pPr marL="0" indent="0">
+              <a:buNone/>
+            </a:pPr>
+            <a:r>
+              <a:rPr kumimoji="1" lang="en-US" altLang="zh-CN" dirty="0"/>
+              <a:t>  typedef</a:t>
+            </a:r>
+            <a:r>
+              <a:rPr kumimoji="1" lang="zh-CN" altLang="en-US" dirty="0"/>
               <a:t> </a:t>
             </a:r>
             <a:r>
+              <a:rPr lang="zh-CN" altLang="en-US" dirty="0">
+                <a:latin typeface="Courier New" panose="02070409020205090404" pitchFamily="49" charset="0"/>
+              </a:rPr>
+              <a:t> </a:t>
+            </a:r>
+            <a:r>
               <a:rPr lang="en-US" altLang="zh-CN" dirty="0">
-                <a:latin typeface="Courier New" panose="02070309020205020404" pitchFamily="49" charset="0"/>
-              </a:rPr>
-              <a:t>uint8_t;</a:t>
-            </a:r>
-          </a:p>
-          <a:p>
-            <a:pPr marL="0" indent="0">
-              <a:buNone/>
-            </a:pPr>
-            <a:endParaRPr kumimoji="1" lang="en-US" altLang="zh-CN" dirty="0">
-              <a:latin typeface="Courier New" panose="02070309020205020404" pitchFamily="49" charset="0"/>
+                <a:latin typeface="Courier New" panose="02070409020205090404" pitchFamily="49" charset="0"/>
+              </a:rPr>
+              <a:t>short</a:t>
+            </a:r>
+            <a:r>
+              <a:rPr lang="pt-BR" altLang="zh-CN" dirty="0">
+                <a:latin typeface="Courier New" panose="02070409020205090404" pitchFamily="49" charset="0"/>
+              </a:rPr>
+              <a:t> </a:t>
+            </a:r>
+            <a:r>
+              <a:rPr lang="en-US" altLang="zh-CN" dirty="0">
+                <a:latin typeface="Courier New" panose="02070409020205090404" pitchFamily="49" charset="0"/>
+              </a:rPr>
+              <a:t>int16_t;</a:t>
+            </a:r>
+            <a:endParaRPr lang="en-US" altLang="zh-CN" dirty="0">
+              <a:latin typeface="Courier New" panose="02070409020205090404" pitchFamily="49" charset="0"/>
             </a:endParaRPr>
           </a:p>
           <a:p>
@@ -7220,149 +6662,45 @@
             </a:r>
             <a:r>
               <a:rPr lang="zh-CN" altLang="en-US" dirty="0">
-                <a:latin typeface="Courier New" panose="02070309020205020404" pitchFamily="49" charset="0"/>
+                <a:latin typeface="Courier New" panose="02070409020205090404" pitchFamily="49" charset="0"/>
               </a:rPr>
               <a:t> </a:t>
             </a:r>
             <a:r>
-              <a:rPr lang="pt-BR" altLang="zh-CN" dirty="0" err="1">
-                <a:latin typeface="Courier New" panose="02070309020205020404" pitchFamily="49" charset="0"/>
-              </a:rPr>
-              <a:t>int</a:t>
+              <a:rPr lang="en-US" altLang="zh-CN" dirty="0">
+                <a:latin typeface="Courier New" panose="02070409020205090404" pitchFamily="49" charset="0"/>
+              </a:rPr>
+              <a:t>char</a:t>
             </a:r>
             <a:r>
               <a:rPr lang="pt-BR" altLang="zh-CN" dirty="0">
-                <a:latin typeface="Courier New" panose="02070309020205020404" pitchFamily="49" charset="0"/>
+                <a:latin typeface="Courier New" panose="02070409020205090404" pitchFamily="49" charset="0"/>
               </a:rPr>
               <a:t> </a:t>
             </a:r>
             <a:r>
+              <a:rPr lang="en-US" altLang="zh-CN">
+                <a:latin typeface="Courier New" panose="02070409020205090404" pitchFamily="49" charset="0"/>
+              </a:rPr>
+              <a:t>int8_</a:t>
+            </a:r>
+            <a:r>
               <a:rPr lang="en-US" altLang="zh-CN" dirty="0">
-                <a:latin typeface="Courier New" panose="02070309020205020404" pitchFamily="49" charset="0"/>
-              </a:rPr>
-              <a:t>int</a:t>
-            </a:r>
-            <a:r>
-              <a:rPr lang="pt-BR" altLang="zh-CN" dirty="0">
-                <a:latin typeface="Courier New" panose="02070309020205020404" pitchFamily="49" charset="0"/>
-              </a:rPr>
-              <a:t>32</a:t>
-            </a:r>
-            <a:r>
-              <a:rPr lang="en-US" altLang="zh-CN" dirty="0">
-                <a:latin typeface="Courier New" panose="02070309020205020404" pitchFamily="49" charset="0"/>
-              </a:rPr>
-              <a:t>_t;</a:t>
-            </a:r>
-            <a:endParaRPr lang="pt-BR" altLang="zh-CN" dirty="0">
-              <a:latin typeface="Courier New" panose="02070309020205020404" pitchFamily="49" charset="0"/>
-            </a:endParaRPr>
+                <a:latin typeface="Courier New" panose="02070409020205090404" pitchFamily="49" charset="0"/>
+              </a:rPr>
+              <a:t>t;</a:t>
+            </a:r>
+            <a:endParaRPr kumimoji="1" lang="zh-CN" altLang="en-US" dirty="0"/>
           </a:p>
           <a:p>
             <a:pPr marL="0" indent="0">
               <a:buNone/>
             </a:pPr>
-            <a:r>
-              <a:rPr kumimoji="1" lang="zh-CN" altLang="en-US" dirty="0">
-                <a:latin typeface="Courier New" panose="02070309020205020404" pitchFamily="49" charset="0"/>
-              </a:rPr>
-              <a:t> </a:t>
-            </a:r>
-            <a:r>
-              <a:rPr kumimoji="1" lang="en-US" altLang="zh-CN" dirty="0"/>
-              <a:t>typedef</a:t>
-            </a:r>
-            <a:r>
-              <a:rPr kumimoji="1" lang="zh-CN" altLang="en-US" dirty="0"/>
-              <a:t> </a:t>
-            </a:r>
-            <a:r>
-              <a:rPr lang="zh-CN" altLang="en-US" dirty="0">
-                <a:latin typeface="Courier New" panose="02070309020205020404" pitchFamily="49" charset="0"/>
-              </a:rPr>
-              <a:t> </a:t>
-            </a:r>
-            <a:r>
-              <a:rPr lang="en-US" altLang="zh-CN" dirty="0">
-                <a:latin typeface="Courier New" panose="02070309020205020404" pitchFamily="49" charset="0"/>
-              </a:rPr>
-              <a:t>short</a:t>
-            </a:r>
-            <a:r>
-              <a:rPr lang="pt-BR" altLang="zh-CN" dirty="0">
-                <a:latin typeface="Courier New" panose="02070309020205020404" pitchFamily="49" charset="0"/>
-              </a:rPr>
-              <a:t> </a:t>
-            </a:r>
-            <a:r>
-              <a:rPr lang="en-US" altLang="zh-CN" dirty="0">
-                <a:latin typeface="Courier New" panose="02070309020205020404" pitchFamily="49" charset="0"/>
-              </a:rPr>
-              <a:t>int16_t;</a:t>
-            </a:r>
-          </a:p>
-          <a:p>
-            <a:pPr marL="0" indent="0">
-              <a:buNone/>
-            </a:pPr>
-            <a:r>
-              <a:rPr kumimoji="1" lang="zh-CN" altLang="en-US" dirty="0"/>
-              <a:t>  </a:t>
-            </a:r>
-            <a:r>
-              <a:rPr kumimoji="1" lang="en-US" altLang="zh-CN" dirty="0"/>
-              <a:t>typedef</a:t>
-            </a:r>
-            <a:r>
-              <a:rPr kumimoji="1" lang="zh-CN" altLang="en-US" dirty="0"/>
-              <a:t> </a:t>
-            </a:r>
-            <a:r>
-              <a:rPr lang="zh-CN" altLang="en-US" dirty="0">
-                <a:latin typeface="Courier New" panose="02070309020205020404" pitchFamily="49" charset="0"/>
-              </a:rPr>
-              <a:t> </a:t>
-            </a:r>
-            <a:r>
-              <a:rPr lang="en-US" altLang="zh-CN" dirty="0">
-                <a:latin typeface="Courier New" panose="02070309020205020404" pitchFamily="49" charset="0"/>
-              </a:rPr>
-              <a:t>char</a:t>
-            </a:r>
-            <a:r>
-              <a:rPr lang="pt-BR" altLang="zh-CN" dirty="0">
-                <a:latin typeface="Courier New" panose="02070309020205020404" pitchFamily="49" charset="0"/>
-              </a:rPr>
-              <a:t> </a:t>
-            </a:r>
-            <a:r>
-              <a:rPr lang="en-US" altLang="zh-CN">
-                <a:latin typeface="Courier New" panose="02070309020205020404" pitchFamily="49" charset="0"/>
-              </a:rPr>
-              <a:t>int8_</a:t>
-            </a:r>
-            <a:r>
-              <a:rPr lang="en-US" altLang="zh-CN" dirty="0">
-                <a:latin typeface="Courier New" panose="02070309020205020404" pitchFamily="49" charset="0"/>
-              </a:rPr>
-              <a:t>t;</a:t>
-            </a:r>
             <a:endParaRPr kumimoji="1" lang="zh-CN" altLang="en-US" dirty="0"/>
           </a:p>
-          <a:p>
-            <a:pPr marL="0" indent="0">
-              <a:buNone/>
-            </a:pPr>
-            <a:endParaRPr kumimoji="1" lang="zh-CN" altLang="en-US" dirty="0"/>
-          </a:p>
         </p:txBody>
       </p:sp>
     </p:spTree>
-    <p:extLst>
-      <p:ext uri="{BB962C8B-B14F-4D97-AF65-F5344CB8AC3E}">
-        <p14:creationId xmlns:p14="http://schemas.microsoft.com/office/powerpoint/2010/main" val="1937744758"/>
-      </p:ext>
-    </p:extLst>
   </p:cSld>
   <p:clrMapOvr>
     <a:masterClrMapping/>
@@ -7389,13 +6727,7 @@
       </p:grpSpPr>
       <p:sp>
         <p:nvSpPr>
-          <p:cNvPr id="2" name="标题 1">
-            <a:extLst>
-              <a:ext uri="{FF2B5EF4-FFF2-40B4-BE49-F238E27FC236}">
-                <a16:creationId xmlns:a16="http://schemas.microsoft.com/office/drawing/2014/main" id="{B0F5F8E1-B45A-7A4B-822F-9AFD7A1321B2}"/>
-              </a:ext>
-            </a:extLst>
-          </p:cNvPr>
+          <p:cNvPr id="2" name="标题 1"/>
           <p:cNvSpPr>
             <a:spLocks noGrp="1"/>
           </p:cNvSpPr>
@@ -7416,18 +6748,13 @@
               <a:rPr kumimoji="1" lang="zh-CN" altLang="en-US" dirty="0"/>
               <a:t>语言数据类型</a:t>
             </a:r>
-          </a:p>
-        </p:txBody>
-      </p:sp>
-      <p:sp>
-        <p:nvSpPr>
-          <p:cNvPr id="3" name="内容占位符 2">
-            <a:extLst>
-              <a:ext uri="{FF2B5EF4-FFF2-40B4-BE49-F238E27FC236}">
-                <a16:creationId xmlns:a16="http://schemas.microsoft.com/office/drawing/2014/main" id="{6633FA2E-4931-3B4A-BCE8-2EE3DF3C1512}"/>
-              </a:ext>
-            </a:extLst>
-          </p:cNvPr>
+            <a:endParaRPr kumimoji="1" lang="zh-CN" altLang="en-US" dirty="0"/>
+          </a:p>
+        </p:txBody>
+      </p:sp>
+      <p:sp>
+        <p:nvSpPr>
+          <p:cNvPr id="3" name="内容占位符 2"/>
           <p:cNvSpPr>
             <a:spLocks noGrp="1"/>
           </p:cNvSpPr>
@@ -7482,24 +6809,24 @@
             </a:r>
             <a:r>
               <a:rPr lang="pt-BR" altLang="zh-CN" dirty="0" err="1">
-                <a:latin typeface="Courier New" panose="02070309020205020404" pitchFamily="49" charset="0"/>
+                <a:latin typeface="Courier New" panose="02070409020205090404" pitchFamily="49" charset="0"/>
               </a:rPr>
               <a:t>unsigned</a:t>
             </a:r>
             <a:r>
               <a:rPr lang="pt-BR" altLang="zh-CN" dirty="0">
-                <a:latin typeface="Courier New" panose="02070309020205020404" pitchFamily="49" charset="0"/>
+                <a:latin typeface="Courier New" panose="02070409020205090404" pitchFamily="49" charset="0"/>
               </a:rPr>
               <a:t> </a:t>
             </a:r>
             <a:r>
               <a:rPr lang="pt-BR" altLang="zh-CN" dirty="0" err="1">
-                <a:latin typeface="Courier New" panose="02070309020205020404" pitchFamily="49" charset="0"/>
+                <a:latin typeface="Courier New" panose="02070409020205090404" pitchFamily="49" charset="0"/>
               </a:rPr>
               <a:t>int</a:t>
             </a:r>
             <a:endParaRPr lang="pt-BR" altLang="zh-CN" dirty="0">
-              <a:latin typeface="Courier New" panose="02070309020205020404" pitchFamily="49" charset="0"/>
+              <a:latin typeface="Courier New" panose="02070409020205090404" pitchFamily="49" charset="0"/>
             </a:endParaRPr>
           </a:p>
           <a:p>
@@ -7508,7 +6835,7 @@
             </a:pPr>
             <a:r>
               <a:rPr kumimoji="1" lang="zh-CN" altLang="en-US" dirty="0">
-                <a:latin typeface="Courier New" panose="02070309020205020404" pitchFamily="49" charset="0"/>
+                <a:latin typeface="Courier New" panose="02070409020205090404" pitchFamily="49" charset="0"/>
               </a:rPr>
               <a:t> </a:t>
             </a:r>
@@ -7530,24 +6857,24 @@
             </a:r>
             <a:r>
               <a:rPr lang="pt-BR" altLang="zh-CN" dirty="0" err="1">
-                <a:latin typeface="Courier New" panose="02070309020205020404" pitchFamily="49" charset="0"/>
+                <a:latin typeface="Courier New" panose="02070409020205090404" pitchFamily="49" charset="0"/>
               </a:rPr>
               <a:t>unsigned</a:t>
             </a:r>
             <a:r>
               <a:rPr lang="pt-BR" altLang="zh-CN" dirty="0">
-                <a:latin typeface="Courier New" panose="02070309020205020404" pitchFamily="49" charset="0"/>
+                <a:latin typeface="Courier New" panose="02070409020205090404" pitchFamily="49" charset="0"/>
               </a:rPr>
               <a:t> </a:t>
             </a:r>
             <a:r>
               <a:rPr lang="en-US" altLang="zh-CN" dirty="0">
-                <a:latin typeface="Courier New" panose="02070309020205020404" pitchFamily="49" charset="0"/>
+                <a:latin typeface="Courier New" panose="02070409020205090404" pitchFamily="49" charset="0"/>
               </a:rPr>
               <a:t>short</a:t>
             </a:r>
             <a:endParaRPr lang="pt-BR" altLang="zh-CN" dirty="0">
-              <a:latin typeface="Courier New" panose="02070309020205020404" pitchFamily="49" charset="0"/>
+              <a:latin typeface="Courier New" panose="02070409020205090404" pitchFamily="49" charset="0"/>
             </a:endParaRPr>
           </a:p>
           <a:p>
@@ -7576,24 +6903,24 @@
             </a:r>
             <a:r>
               <a:rPr lang="pt-BR" altLang="zh-CN" dirty="0" err="1">
-                <a:latin typeface="Courier New" panose="02070309020205020404" pitchFamily="49" charset="0"/>
+                <a:latin typeface="Courier New" panose="02070409020205090404" pitchFamily="49" charset="0"/>
               </a:rPr>
               <a:t>unsigned</a:t>
             </a:r>
             <a:r>
               <a:rPr lang="pt-BR" altLang="zh-CN" dirty="0">
-                <a:latin typeface="Courier New" panose="02070309020205020404" pitchFamily="49" charset="0"/>
+                <a:latin typeface="Courier New" panose="02070409020205090404" pitchFamily="49" charset="0"/>
               </a:rPr>
               <a:t> </a:t>
             </a:r>
             <a:r>
               <a:rPr lang="en-US" altLang="zh-CN" dirty="0">
-                <a:latin typeface="Courier New" panose="02070309020205020404" pitchFamily="49" charset="0"/>
+                <a:latin typeface="Courier New" panose="02070409020205090404" pitchFamily="49" charset="0"/>
               </a:rPr>
               <a:t>char</a:t>
             </a:r>
             <a:endParaRPr lang="pt-BR" altLang="zh-CN" dirty="0">
-              <a:latin typeface="Courier New" panose="02070309020205020404" pitchFamily="49" charset="0"/>
+              <a:latin typeface="Courier New" panose="02070409020205090404" pitchFamily="49" charset="0"/>
             </a:endParaRPr>
           </a:p>
           <a:p>
@@ -7618,18 +6945,18 @@
             </a:r>
             <a:r>
               <a:rPr lang="pt-BR" altLang="zh-CN" dirty="0">
-                <a:latin typeface="Courier New" panose="02070309020205020404" pitchFamily="49" charset="0"/>
+                <a:latin typeface="Courier New" panose="02070409020205090404" pitchFamily="49" charset="0"/>
               </a:rPr>
               <a:t> </a:t>
             </a:r>
             <a:r>
               <a:rPr lang="pt-BR" altLang="zh-CN" dirty="0" err="1">
-                <a:latin typeface="Courier New" panose="02070309020205020404" pitchFamily="49" charset="0"/>
+                <a:latin typeface="Courier New" panose="02070409020205090404" pitchFamily="49" charset="0"/>
               </a:rPr>
               <a:t>int</a:t>
             </a:r>
             <a:endParaRPr lang="pt-BR" altLang="zh-CN" dirty="0">
-              <a:latin typeface="Courier New" panose="02070309020205020404" pitchFamily="49" charset="0"/>
+              <a:latin typeface="Courier New" panose="02070409020205090404" pitchFamily="49" charset="0"/>
             </a:endParaRPr>
           </a:p>
           <a:p>
@@ -7638,7 +6965,7 @@
             </a:pPr>
             <a:r>
               <a:rPr kumimoji="1" lang="zh-CN" altLang="en-US" dirty="0">
-                <a:latin typeface="Courier New" panose="02070309020205020404" pitchFamily="49" charset="0"/>
+                <a:latin typeface="Courier New" panose="02070409020205090404" pitchFamily="49" charset="0"/>
               </a:rPr>
               <a:t> </a:t>
             </a:r>
@@ -7660,12 +6987,12 @@
             </a:r>
             <a:r>
               <a:rPr lang="en-US" altLang="zh-CN" dirty="0">
-                <a:latin typeface="Courier New" panose="02070309020205020404" pitchFamily="49" charset="0"/>
+                <a:latin typeface="Courier New" panose="02070409020205090404" pitchFamily="49" charset="0"/>
               </a:rPr>
               <a:t>short</a:t>
             </a:r>
             <a:endParaRPr lang="pt-BR" altLang="zh-CN" dirty="0">
-              <a:latin typeface="Courier New" panose="02070309020205020404" pitchFamily="49" charset="0"/>
+              <a:latin typeface="Courier New" panose="02070409020205090404" pitchFamily="49" charset="0"/>
             </a:endParaRPr>
           </a:p>
           <a:p>
@@ -7694,12 +7021,12 @@
             </a:r>
             <a:r>
               <a:rPr lang="en-US" altLang="zh-CN" dirty="0">
-                <a:latin typeface="Courier New" panose="02070309020205020404" pitchFamily="49" charset="0"/>
+                <a:latin typeface="Courier New" panose="02070409020205090404" pitchFamily="49" charset="0"/>
               </a:rPr>
               <a:t>char</a:t>
             </a:r>
             <a:endParaRPr lang="pt-BR" altLang="zh-CN" dirty="0">
-              <a:latin typeface="Courier New" panose="02070309020205020404" pitchFamily="49" charset="0"/>
+              <a:latin typeface="Courier New" panose="02070409020205090404" pitchFamily="49" charset="0"/>
             </a:endParaRPr>
           </a:p>
           <a:p>
@@ -7711,11 +7038,6 @@
         </p:txBody>
       </p:sp>
     </p:spTree>
-    <p:extLst>
-      <p:ext uri="{BB962C8B-B14F-4D97-AF65-F5344CB8AC3E}">
-        <p14:creationId xmlns:p14="http://schemas.microsoft.com/office/powerpoint/2010/main" val="505009877"/>
-      </p:ext>
-    </p:extLst>
   </p:cSld>
   <p:clrMapOvr>
     <a:masterClrMapping/>
@@ -7742,13 +7064,7 @@
       </p:grpSpPr>
       <p:sp>
         <p:nvSpPr>
-          <p:cNvPr id="2" name="标题 1">
-            <a:extLst>
-              <a:ext uri="{FF2B5EF4-FFF2-40B4-BE49-F238E27FC236}">
-                <a16:creationId xmlns:a16="http://schemas.microsoft.com/office/drawing/2014/main" id="{C61F0AE9-750B-1C48-B255-308E33FB4FB9}"/>
-              </a:ext>
-            </a:extLst>
-          </p:cNvPr>
+          <p:cNvPr id="2" name="标题 1"/>
           <p:cNvSpPr>
             <a:spLocks noGrp="1"/>
           </p:cNvSpPr>
@@ -7765,18 +7081,13 @@
               <a:rPr kumimoji="1" lang="zh-CN" altLang="en-US" dirty="0"/>
               <a:t>注意：</a:t>
             </a:r>
-          </a:p>
-        </p:txBody>
-      </p:sp>
-      <p:sp>
-        <p:nvSpPr>
-          <p:cNvPr id="3" name="内容占位符 2">
-            <a:extLst>
-              <a:ext uri="{FF2B5EF4-FFF2-40B4-BE49-F238E27FC236}">
-                <a16:creationId xmlns:a16="http://schemas.microsoft.com/office/drawing/2014/main" id="{40C72276-946D-024D-ABED-A5E1FDFBA213}"/>
-              </a:ext>
-            </a:extLst>
-          </p:cNvPr>
+            <a:endParaRPr kumimoji="1" lang="zh-CN" altLang="en-US" dirty="0"/>
+          </a:p>
+        </p:txBody>
+      </p:sp>
+      <p:sp>
+        <p:nvSpPr>
+          <p:cNvPr id="3" name="内容占位符 2"/>
           <p:cNvSpPr>
             <a:spLocks noGrp="1"/>
           </p:cNvSpPr>
@@ -7855,11 +7166,6 @@
         </p:txBody>
       </p:sp>
     </p:spTree>
-    <p:extLst>
-      <p:ext uri="{BB962C8B-B14F-4D97-AF65-F5344CB8AC3E}">
-        <p14:creationId xmlns:p14="http://schemas.microsoft.com/office/powerpoint/2010/main" val="1648429340"/>
-      </p:ext>
-    </p:extLst>
   </p:cSld>
   <p:clrMapOvr>
     <a:masterClrMapping/>
@@ -7886,13 +7192,7 @@
       </p:grpSpPr>
       <p:sp>
         <p:nvSpPr>
-          <p:cNvPr id="2" name="标题 1">
-            <a:extLst>
-              <a:ext uri="{FF2B5EF4-FFF2-40B4-BE49-F238E27FC236}">
-                <a16:creationId xmlns:a16="http://schemas.microsoft.com/office/drawing/2014/main" id="{382F7759-3E75-244C-99D5-DDD0D6A896A7}"/>
-              </a:ext>
-            </a:extLst>
-          </p:cNvPr>
+          <p:cNvPr id="2" name="标题 1"/>
           <p:cNvSpPr>
             <a:spLocks noGrp="1"/>
           </p:cNvSpPr>
@@ -7909,18 +7209,13 @@
               <a:rPr kumimoji="1" lang="zh-CN" altLang="en-US" dirty="0"/>
               <a:t>数据类型</a:t>
             </a:r>
-          </a:p>
-        </p:txBody>
-      </p:sp>
-      <p:sp>
-        <p:nvSpPr>
-          <p:cNvPr id="3" name="内容占位符 2">
-            <a:extLst>
-              <a:ext uri="{FF2B5EF4-FFF2-40B4-BE49-F238E27FC236}">
-                <a16:creationId xmlns:a16="http://schemas.microsoft.com/office/drawing/2014/main" id="{478547B4-B3C0-144E-8F65-51DB7322DF81}"/>
-              </a:ext>
-            </a:extLst>
-          </p:cNvPr>
+            <a:endParaRPr kumimoji="1" lang="zh-CN" altLang="en-US" dirty="0"/>
+          </a:p>
+        </p:txBody>
+      </p:sp>
+      <p:sp>
+        <p:nvSpPr>
+          <p:cNvPr id="3" name="内容占位符 2"/>
           <p:cNvSpPr>
             <a:spLocks noGrp="1"/>
           </p:cNvSpPr>
@@ -7940,7 +7235,7 @@
                     <a:srgbClr val="C0C0C0"/>
                   </a:outerShdw>
                 </a:effectLst>
-                <a:latin typeface="Times New Roman" panose="02020603050405020304" pitchFamily="18" charset="0"/>
+                <a:latin typeface="Times New Roman" panose="02020503050405090304" pitchFamily="18" charset="0"/>
               </a:rPr>
               <a:t>volatile</a:t>
             </a:r>
@@ -7951,7 +7246,7 @@
                     <a:srgbClr val="C0C0C0"/>
                   </a:outerShdw>
                 </a:effectLst>
-                <a:latin typeface="Times New Roman" panose="02020603050405020304" pitchFamily="18" charset="0"/>
+                <a:latin typeface="Times New Roman" panose="02020503050405090304" pitchFamily="18" charset="0"/>
               </a:rPr>
               <a:t>和强制类型转换</a:t>
             </a:r>
@@ -7961,7 +7256,7 @@
                   <a:srgbClr val="C0C0C0"/>
                 </a:outerShdw>
               </a:effectLst>
-              <a:latin typeface="Times New Roman" panose="02020603050405020304" pitchFamily="18" charset="0"/>
+              <a:latin typeface="Times New Roman" panose="02020503050405090304" pitchFamily="18" charset="0"/>
             </a:endParaRPr>
           </a:p>
           <a:p>
@@ -8016,7 +7311,7 @@
               <a:rPr kumimoji="1" lang="zh-CN" altLang="en-US" dirty="0">
                 <a:latin typeface="华文楷体" panose="02010600040101010101" pitchFamily="2" charset="-122"/>
                 <a:ea typeface="华文楷体" panose="02010600040101010101" pitchFamily="2" charset="-122"/>
-                <a:sym typeface="Wingdings" pitchFamily="2" charset="2"/>
+                <a:sym typeface="Wingdings" panose="05000000000000000000" pitchFamily="2" charset="2"/>
               </a:rPr>
               <a:t>（</a:t>
             </a:r>
@@ -8024,7 +7319,7 @@
               <a:rPr kumimoji="1" lang="en-US" altLang="zh-CN" dirty="0">
                 <a:latin typeface="华文楷体" panose="02010600040101010101" pitchFamily="2" charset="-122"/>
                 <a:ea typeface="华文楷体" panose="02010600040101010101" pitchFamily="2" charset="-122"/>
-                <a:sym typeface="Wingdings" pitchFamily="2" charset="2"/>
+                <a:sym typeface="Wingdings" panose="05000000000000000000" pitchFamily="2" charset="2"/>
               </a:rPr>
               <a:t>gnu</a:t>
             </a:r>
@@ -8032,7 +7327,7 @@
               <a:rPr kumimoji="1" lang="zh-CN" altLang="en-US" dirty="0">
                 <a:latin typeface="华文楷体" panose="02010600040101010101" pitchFamily="2" charset="-122"/>
                 <a:ea typeface="华文楷体" panose="02010600040101010101" pitchFamily="2" charset="-122"/>
-                <a:sym typeface="Wingdings" pitchFamily="2" charset="2"/>
+                <a:sym typeface="Wingdings" panose="05000000000000000000" pitchFamily="2" charset="2"/>
               </a:rPr>
               <a:t> </a:t>
             </a:r>
@@ -8040,7 +7335,7 @@
               <a:rPr kumimoji="1" lang="en-US" altLang="zh-CN" dirty="0">
                 <a:latin typeface="华文楷体" panose="02010600040101010101" pitchFamily="2" charset="-122"/>
                 <a:ea typeface="华文楷体" panose="02010600040101010101" pitchFamily="2" charset="-122"/>
-                <a:sym typeface="Wingdings" pitchFamily="2" charset="2"/>
+                <a:sym typeface="Wingdings" panose="05000000000000000000" pitchFamily="2" charset="2"/>
               </a:rPr>
               <a:t>c</a:t>
             </a:r>
@@ -8048,14 +7343,14 @@
               <a:rPr kumimoji="1" lang="zh-CN" altLang="en-US" dirty="0">
                 <a:latin typeface="华文楷体" panose="02010600040101010101" pitchFamily="2" charset="-122"/>
                 <a:ea typeface="华文楷体" panose="02010600040101010101" pitchFamily="2" charset="-122"/>
-                <a:sym typeface="Wingdings" pitchFamily="2" charset="2"/>
+                <a:sym typeface="Wingdings" panose="05000000000000000000" pitchFamily="2" charset="2"/>
               </a:rPr>
               <a:t>中可能是小写的）</a:t>
             </a:r>
             <a:endParaRPr kumimoji="1" lang="en-US" altLang="zh-CN" dirty="0">
               <a:latin typeface="华文楷体" panose="02010600040101010101" pitchFamily="2" charset="-122"/>
               <a:ea typeface="华文楷体" panose="02010600040101010101" pitchFamily="2" charset="-122"/>
-              <a:sym typeface="Wingdings" pitchFamily="2" charset="2"/>
+              <a:sym typeface="Wingdings" panose="05000000000000000000" pitchFamily="2" charset="2"/>
             </a:endParaRPr>
           </a:p>
           <a:p>
@@ -8135,6 +7430,11 @@
               </a:rPr>
               <a:t>权限</a:t>
             </a:r>
+            <a:endParaRPr kumimoji="1" lang="zh-CN" altLang="en-US" sz="2400" dirty="0">
+              <a:solidFill>
+                <a:srgbClr val="C00000"/>
+              </a:solidFill>
+            </a:endParaRPr>
           </a:p>
           <a:p>
             <a:pPr marL="0" indent="0">
@@ -8204,6 +7504,11 @@
               </a:rPr>
               <a:t>权限</a:t>
             </a:r>
+            <a:endParaRPr kumimoji="1" lang="zh-CN" altLang="en-US" sz="2400" dirty="0">
+              <a:solidFill>
+                <a:srgbClr val="C00000"/>
+              </a:solidFill>
+            </a:endParaRPr>
           </a:p>
           <a:p>
             <a:pPr marL="0" indent="0">
@@ -8289,15 +7594,15 @@
               </a:rPr>
               <a:t>权限</a:t>
             </a:r>
+            <a:endParaRPr kumimoji="1" lang="zh-CN" altLang="en-US" sz="2400" dirty="0">
+              <a:solidFill>
+                <a:srgbClr val="C00000"/>
+              </a:solidFill>
+            </a:endParaRPr>
           </a:p>
         </p:txBody>
       </p:sp>
     </p:spTree>
-    <p:extLst>
-      <p:ext uri="{BB962C8B-B14F-4D97-AF65-F5344CB8AC3E}">
-        <p14:creationId xmlns:p14="http://schemas.microsoft.com/office/powerpoint/2010/main" val="3584059455"/>
-      </p:ext>
-    </p:extLst>
   </p:cSld>
   <p:clrMapOvr>
     <a:masterClrMapping/>
@@ -8324,13 +7629,7 @@
       </p:grpSpPr>
       <p:sp>
         <p:nvSpPr>
-          <p:cNvPr id="2" name="标题 1">
-            <a:extLst>
-              <a:ext uri="{FF2B5EF4-FFF2-40B4-BE49-F238E27FC236}">
-                <a16:creationId xmlns:a16="http://schemas.microsoft.com/office/drawing/2014/main" id="{24874EDB-356F-CD48-B982-9B67AD7FCD91}"/>
-              </a:ext>
-            </a:extLst>
-          </p:cNvPr>
+          <p:cNvPr id="2" name="标题 1"/>
           <p:cNvSpPr>
             <a:spLocks noGrp="1"/>
           </p:cNvSpPr>
@@ -8347,18 +7646,13 @@
               <a:rPr kumimoji="1" lang="zh-CN" altLang="en-US" dirty="0"/>
               <a:t>数据类型</a:t>
             </a:r>
-          </a:p>
-        </p:txBody>
-      </p:sp>
-      <p:sp>
-        <p:nvSpPr>
-          <p:cNvPr id="3" name="内容占位符 2">
-            <a:extLst>
-              <a:ext uri="{FF2B5EF4-FFF2-40B4-BE49-F238E27FC236}">
-                <a16:creationId xmlns:a16="http://schemas.microsoft.com/office/drawing/2014/main" id="{75FAC116-3C4B-694C-B5D3-59A57F4018AD}"/>
-              </a:ext>
-            </a:extLst>
-          </p:cNvPr>
+            <a:endParaRPr kumimoji="1" lang="zh-CN" altLang="en-US" dirty="0"/>
+          </a:p>
+        </p:txBody>
+      </p:sp>
+      <p:sp>
+        <p:nvSpPr>
+          <p:cNvPr id="3" name="内容占位符 2"/>
           <p:cNvSpPr>
             <a:spLocks noGrp="1"/>
           </p:cNvSpPr>
@@ -8435,15 +7729,11 @@
               <a:rPr kumimoji="1" lang="zh-CN" altLang="en-US" dirty="0"/>
               <a:t>，可能位宽不一样！</a:t>
             </a:r>
+            <a:endParaRPr kumimoji="1" lang="zh-CN" altLang="en-US" dirty="0"/>
           </a:p>
         </p:txBody>
       </p:sp>
     </p:spTree>
-    <p:extLst>
-      <p:ext uri="{BB962C8B-B14F-4D97-AF65-F5344CB8AC3E}">
-        <p14:creationId xmlns:p14="http://schemas.microsoft.com/office/powerpoint/2010/main" val="3719653001"/>
-      </p:ext>
-    </p:extLst>
   </p:cSld>
   <p:clrMapOvr>
     <a:masterClrMapping/>
@@ -8470,13 +7760,7 @@
       </p:grpSpPr>
       <p:sp>
         <p:nvSpPr>
-          <p:cNvPr id="2" name="标题 1">
-            <a:extLst>
-              <a:ext uri="{FF2B5EF4-FFF2-40B4-BE49-F238E27FC236}">
-                <a16:creationId xmlns:a16="http://schemas.microsoft.com/office/drawing/2014/main" id="{8EAC3D62-4413-104C-8C61-FDA4E41E8745}"/>
-              </a:ext>
-            </a:extLst>
-          </p:cNvPr>
+          <p:cNvPr id="2" name="标题 1"/>
           <p:cNvSpPr>
             <a:spLocks noGrp="1"/>
           </p:cNvSpPr>
@@ -8493,18 +7777,13 @@
               <a:rPr kumimoji="1" lang="zh-CN" altLang="en-US" dirty="0"/>
               <a:t>基本语法</a:t>
             </a:r>
-          </a:p>
-        </p:txBody>
-      </p:sp>
-      <p:sp>
-        <p:nvSpPr>
-          <p:cNvPr id="3" name="内容占位符 2">
-            <a:extLst>
-              <a:ext uri="{FF2B5EF4-FFF2-40B4-BE49-F238E27FC236}">
-                <a16:creationId xmlns:a16="http://schemas.microsoft.com/office/drawing/2014/main" id="{D7044E8E-5CE3-BB41-9649-BDBBC21BEDB9}"/>
-              </a:ext>
-            </a:extLst>
-          </p:cNvPr>
+            <a:endParaRPr kumimoji="1" lang="zh-CN" altLang="en-US" dirty="0"/>
+          </a:p>
+        </p:txBody>
+      </p:sp>
+      <p:sp>
+        <p:nvSpPr>
+          <p:cNvPr id="3" name="内容占位符 2"/>
           <p:cNvSpPr>
             <a:spLocks noGrp="1"/>
           </p:cNvSpPr>
@@ -8592,11 +7871,6 @@
         </p:txBody>
       </p:sp>
     </p:spTree>
-    <p:extLst>
-      <p:ext uri="{BB962C8B-B14F-4D97-AF65-F5344CB8AC3E}">
-        <p14:creationId xmlns:p14="http://schemas.microsoft.com/office/powerpoint/2010/main" val="2895303107"/>
-      </p:ext>
-    </p:extLst>
   </p:cSld>
   <p:clrMapOvr>
     <a:masterClrMapping/>
@@ -8753,6 +8027,9 @@
               </a:rPr>
               <a:t>。</a:t>
             </a:r>
+            <a:endParaRPr lang="zh-CN" altLang="en-US" dirty="0">
+              <a:latin typeface="Times New Roman" panose="02020503050405090304" pitchFamily="18" charset="0"/>
+            </a:endParaRPr>
           </a:p>
           <a:p>
             <a:pPr>
@@ -8808,6 +8085,9 @@
               </a:rPr>
               <a:t>括起来。</a:t>
             </a:r>
+            <a:endParaRPr lang="zh-CN" altLang="en-US" dirty="0">
+              <a:latin typeface="Times New Roman" panose="02020503050405090304" pitchFamily="18" charset="0"/>
+            </a:endParaRPr>
           </a:p>
           <a:p>
             <a:pPr>
@@ -8937,6 +8217,9 @@
               </a:rPr>
               <a:t>{}</a:t>
             </a:r>
+            <a:endParaRPr lang="en-US" altLang="zh-CN" dirty="0">
+              <a:latin typeface="Times New Roman" panose="02020503050405090304" pitchFamily="18" charset="0"/>
+            </a:endParaRPr>
           </a:p>
           <a:p>
             <a:pPr>
@@ -8955,11 +8238,6 @@
         </p:txBody>
       </p:sp>
     </p:spTree>
-    <p:extLst>
-      <p:ext uri="{BB962C8B-B14F-4D97-AF65-F5344CB8AC3E}">
-        <p14:creationId xmlns:p14="http://schemas.microsoft.com/office/powerpoint/2010/main" val="1400194282"/>
-      </p:ext>
-    </p:extLst>
   </p:cSld>
   <p:clrMapOvr>
     <a:masterClrMapping/>
@@ -9010,7 +8288,7 @@
     </a:clrScheme>
     <a:fontScheme name="Office">
       <a:majorFont>
-        <a:latin typeface="等线 Light" panose="020F0302020204030204"/>
+        <a:latin typeface="等线 Light"/>
         <a:ea typeface=""/>
         <a:cs typeface=""/>
         <a:font script="Jpan" typeface="游ゴシック Light"/>
@@ -9043,26 +8321,9 @@
         <a:font script="Viet" typeface="Times New Roman"/>
         <a:font script="Uigh" typeface="Microsoft Uighur"/>
         <a:font script="Geor" typeface="Sylfaen"/>
-        <a:font script="Armn" typeface="Arial"/>
-        <a:font script="Bugi" typeface="Leelawadee UI"/>
-        <a:font script="Bopo" typeface="Microsoft JhengHei"/>
-        <a:font script="Java" typeface="Javanese Text"/>
-        <a:font script="Lisu" typeface="Segoe UI"/>
-        <a:font script="Mymr" typeface="Myanmar Text"/>
-        <a:font script="Nkoo" typeface="Ebrima"/>
-        <a:font script="Olck" typeface="Nirmala UI"/>
-        <a:font script="Osma" typeface="Ebrima"/>
-        <a:font script="Phag" typeface="Phagspa"/>
-        <a:font script="Syrn" typeface="Estrangelo Edessa"/>
-        <a:font script="Syrj" typeface="Estrangelo Edessa"/>
-        <a:font script="Syre" typeface="Estrangelo Edessa"/>
-        <a:font script="Sora" typeface="Nirmala UI"/>
-        <a:font script="Tale" typeface="Microsoft Tai Le"/>
-        <a:font script="Talu" typeface="Microsoft New Tai Lue"/>
-        <a:font script="Tfng" typeface="Ebrima"/>
       </a:majorFont>
       <a:minorFont>
-        <a:latin typeface="等线" panose="020F0502020204030204"/>
+        <a:latin typeface="等线"/>
         <a:ea typeface=""/>
         <a:cs typeface=""/>
         <a:font script="Jpan" typeface="游ゴシック"/>
@@ -9095,23 +8356,6 @@
         <a:font script="Viet" typeface="Arial"/>
         <a:font script="Uigh" typeface="Microsoft Uighur"/>
         <a:font script="Geor" typeface="Sylfaen"/>
-        <a:font script="Armn" typeface="Arial"/>
-        <a:font script="Bugi" typeface="Leelawadee UI"/>
-        <a:font script="Bopo" typeface="Microsoft JhengHei"/>
-        <a:font script="Java" typeface="Javanese Text"/>
-        <a:font script="Lisu" typeface="Segoe UI"/>
-        <a:font script="Mymr" typeface="Myanmar Text"/>
-        <a:font script="Nkoo" typeface="Ebrima"/>
-        <a:font script="Olck" typeface="Nirmala UI"/>
-        <a:font script="Osma" typeface="Ebrima"/>
-        <a:font script="Phag" typeface="Phagspa"/>
-        <a:font script="Syrn" typeface="Estrangelo Edessa"/>
-        <a:font script="Syrj" typeface="Estrangelo Edessa"/>
-        <a:font script="Syre" typeface="Estrangelo Edessa"/>
-        <a:font script="Sora" typeface="Nirmala UI"/>
-        <a:font script="Tale" typeface="Microsoft Tai Le"/>
-        <a:font script="Talu" typeface="Microsoft New Tai Lue"/>
-        <a:font script="Tfng" typeface="Ebrima"/>
       </a:minorFont>
     </a:fontScheme>
     <a:fmtScheme name="Office">
@@ -9252,8 +8496,6 @@
       </a:bgFillStyleLst>
     </a:fmtScheme>
   </a:themeElements>
-  <a:objectDefaults/>
-  <a:extraClrSchemeLst/>
   <a:extLst>
     <a:ext uri="{05A4C25C-085E-4340-85A3-A5531E510DB2}">
       <thm15:themeFamily xmlns:thm15="http://schemas.microsoft.com/office/thememl/2012/main" name="Office Theme" id="{62F939B6-93AF-4DB8-9C6B-D6C7DFDC589F}" vid="{4A3C46E8-61CC-4603-A589-7422A47A8E4A}"/>

</xml_diff>